<commit_message>
Added screenshots to presentation
</commit_message>
<xml_diff>
--- a/Documents/Presentation/PRCS252E - Presentation.pptx
+++ b/Documents/Presentation/PRCS252E - Presentation.pptx
@@ -12,25 +12,17 @@
     <p:sldId id="260" r:id="rId6"/>
     <p:sldId id="266" r:id="rId7"/>
     <p:sldId id="283" r:id="rId8"/>
-    <p:sldId id="261" r:id="rId9"/>
-    <p:sldId id="282" r:id="rId10"/>
-    <p:sldId id="262" r:id="rId11"/>
-    <p:sldId id="263" r:id="rId12"/>
-    <p:sldId id="264" r:id="rId13"/>
-    <p:sldId id="271" r:id="rId14"/>
-    <p:sldId id="270" r:id="rId15"/>
-    <p:sldId id="269" r:id="rId16"/>
-    <p:sldId id="268" r:id="rId17"/>
-    <p:sldId id="267" r:id="rId18"/>
-    <p:sldId id="277" r:id="rId19"/>
-    <p:sldId id="276" r:id="rId20"/>
-    <p:sldId id="275" r:id="rId21"/>
-    <p:sldId id="274" r:id="rId22"/>
-    <p:sldId id="273" r:id="rId23"/>
-    <p:sldId id="272" r:id="rId24"/>
-    <p:sldId id="279" r:id="rId25"/>
-    <p:sldId id="280" r:id="rId26"/>
-    <p:sldId id="281" r:id="rId27"/>
+    <p:sldId id="262" r:id="rId9"/>
+    <p:sldId id="284" r:id="rId10"/>
+    <p:sldId id="271" r:id="rId11"/>
+    <p:sldId id="270" r:id="rId12"/>
+    <p:sldId id="268" r:id="rId13"/>
+    <p:sldId id="277" r:id="rId14"/>
+    <p:sldId id="276" r:id="rId15"/>
+    <p:sldId id="275" r:id="rId16"/>
+    <p:sldId id="273" r:id="rId17"/>
+    <p:sldId id="272" r:id="rId18"/>
+    <p:sldId id="281" r:id="rId19"/>
   </p:sldIdLst>
   <p:sldSz cx="12192000" cy="6858000"/>
   <p:notesSz cx="6858000" cy="9144000"/>
@@ -1447,7 +1439,7 @@
           <a:p>
             <a:fld id="{48A87A34-81AB-432B-8DAE-1953F412C126}" type="datetimeFigureOut">
               <a:rPr lang="en-US" dirty="0"/>
-              <a:t>5/6/2019</a:t>
+              <a:t>5/7/2019</a:t>
             </a:fld>
             <a:endParaRPr lang="en-US"/>
           </a:p>
@@ -1653,7 +1645,7 @@
           <a:p>
             <a:fld id="{48A87A34-81AB-432B-8DAE-1953F412C126}" type="datetimeFigureOut">
               <a:rPr lang="en-US" dirty="0"/>
-              <a:t>5/6/2019</a:t>
+              <a:t>5/7/2019</a:t>
             </a:fld>
             <a:endParaRPr lang="en-US"/>
           </a:p>
@@ -1907,7 +1899,7 @@
           <a:p>
             <a:fld id="{48A87A34-81AB-432B-8DAE-1953F412C126}" type="datetimeFigureOut">
               <a:rPr lang="en-US" dirty="0"/>
-              <a:t>5/6/2019</a:t>
+              <a:t>5/7/2019</a:t>
             </a:fld>
             <a:endParaRPr lang="en-US"/>
           </a:p>
@@ -2075,7 +2067,7 @@
           <a:p>
             <a:fld id="{48A87A34-81AB-432B-8DAE-1953F412C126}" type="datetimeFigureOut">
               <a:rPr lang="en-US" dirty="0"/>
-              <a:t>5/6/2019</a:t>
+              <a:t>5/7/2019</a:t>
             </a:fld>
             <a:endParaRPr lang="en-US"/>
           </a:p>
@@ -2417,7 +2409,7 @@
           <a:p>
             <a:fld id="{48A87A34-81AB-432B-8DAE-1953F412C126}" type="datetimeFigureOut">
               <a:rPr lang="en-US" dirty="0"/>
-              <a:t>5/6/2019</a:t>
+              <a:t>5/7/2019</a:t>
             </a:fld>
             <a:endParaRPr lang="en-US"/>
           </a:p>
@@ -2689,7 +2681,7 @@
           <a:p>
             <a:fld id="{48A87A34-81AB-432B-8DAE-1953F412C126}" type="datetimeFigureOut">
               <a:rPr lang="en-US" dirty="0"/>
-              <a:t>5/6/2019</a:t>
+              <a:t>5/7/2019</a:t>
             </a:fld>
             <a:endParaRPr lang="en-US"/>
           </a:p>
@@ -3065,7 +3057,7 @@
           <a:p>
             <a:fld id="{48A87A34-81AB-432B-8DAE-1953F412C126}" type="datetimeFigureOut">
               <a:rPr lang="en-US" dirty="0"/>
-              <a:t>5/6/2019</a:t>
+              <a:t>5/7/2019</a:t>
             </a:fld>
             <a:endParaRPr lang="en-US"/>
           </a:p>
@@ -3182,7 +3174,7 @@
           <a:p>
             <a:fld id="{48A87A34-81AB-432B-8DAE-1953F412C126}" type="datetimeFigureOut">
               <a:rPr lang="en-US" dirty="0"/>
-              <a:t>5/6/2019</a:t>
+              <a:t>5/7/2019</a:t>
             </a:fld>
             <a:endParaRPr lang="en-US"/>
           </a:p>
@@ -3353,7 +3345,7 @@
           <a:p>
             <a:fld id="{48A87A34-81AB-432B-8DAE-1953F412C126}" type="datetimeFigureOut">
               <a:rPr lang="en-US" dirty="0"/>
-              <a:t>5/6/2019</a:t>
+              <a:t>5/7/2019</a:t>
             </a:fld>
             <a:endParaRPr lang="en-US"/>
           </a:p>
@@ -3705,7 +3697,7 @@
           <a:p>
             <a:fld id="{48A87A34-81AB-432B-8DAE-1953F412C126}" type="datetimeFigureOut">
               <a:rPr lang="en-US" dirty="0"/>
-              <a:t>5/6/2019</a:t>
+              <a:t>5/7/2019</a:t>
             </a:fld>
             <a:endParaRPr lang="en-US"/>
           </a:p>
@@ -4080,7 +4072,7 @@
           <a:p>
             <a:fld id="{48A87A34-81AB-432B-8DAE-1953F412C126}" type="datetimeFigureOut">
               <a:rPr lang="en-US" dirty="0"/>
-              <a:t>5/6/2019</a:t>
+              <a:t>5/7/2019</a:t>
             </a:fld>
             <a:endParaRPr lang="en-US"/>
           </a:p>
@@ -4366,7 +4358,7 @@
             <a:fld id="{48A87A34-81AB-432B-8DAE-1953F412C126}" type="datetimeFigureOut">
               <a:rPr lang="en-US" dirty="0"/>
               <a:pPr/>
-              <a:t>5/6/2019</a:t>
+              <a:t>5/7/2019</a:t>
             </a:fld>
             <a:endParaRPr lang="en-US"/>
           </a:p>
@@ -4969,6 +4961,13 @@
   <p:clrMapOvr>
     <a:masterClrMapping/>
   </p:clrMapOvr>
+  <p:timing>
+    <p:tnLst>
+      <p:par>
+        <p:cTn id="1" dur="indefinite" restart="never" nodeType="tmRoot"/>
+      </p:par>
+    </p:tnLst>
+  </p:timing>
 </p:sld>
 </file>
 
@@ -4994,7 +4993,7 @@
           <p:cNvPr id="2" name="Title 1">
             <a:extLst>
               <a:ext uri="{FF2B5EF4-FFF2-40B4-BE49-F238E27FC236}">
-                <a16:creationId xmlns:a16="http://schemas.microsoft.com/office/drawing/2014/main" id="{181FCE6F-3A44-4C61-8008-82A517D0FE3E}"/>
+                <a16:creationId xmlns:a16="http://schemas.microsoft.com/office/drawing/2014/main" id="{40C92198-EC00-4D49-A34A-5CD4E5A292E1}"/>
               </a:ext>
             </a:extLst>
           </p:cNvPr>
@@ -5012,37 +5011,7 @@
           <a:p>
             <a:r>
               <a:rPr lang="en-US" dirty="0"/>
-              <a:t>Mobile Application</a:t>
-            </a:r>
-          </a:p>
-        </p:txBody>
-      </p:sp>
-      <p:sp>
-        <p:nvSpPr>
-          <p:cNvPr id="3" name="Content Placeholder 2">
-            <a:extLst>
-              <a:ext uri="{FF2B5EF4-FFF2-40B4-BE49-F238E27FC236}">
-                <a16:creationId xmlns:a16="http://schemas.microsoft.com/office/drawing/2014/main" id="{D98B83F6-8DDD-438B-B944-99EBA9134F5A}"/>
-              </a:ext>
-            </a:extLst>
-          </p:cNvPr>
-          <p:cNvSpPr>
-            <a:spLocks noGrp="1"/>
-          </p:cNvSpPr>
-          <p:nvPr>
-            <p:ph idx="1"/>
-          </p:nvPr>
-        </p:nvSpPr>
-        <p:spPr/>
-        <p:txBody>
-          <a:bodyPr vert="horz" lIns="91440" tIns="45720" rIns="91440" bIns="45720" rtlCol="0" anchor="t">
-            <a:normAutofit/>
-          </a:bodyPr>
-          <a:lstStyle/>
-          <a:p>
-            <a:r>
-              <a:rPr lang="en-US"/>
-              <a:t>Searching for a journey:</a:t>
+              <a:t>Web Application Demonstration</a:t>
             </a:r>
           </a:p>
         </p:txBody>
@@ -5050,13 +5019,20 @@
     </p:spTree>
     <p:extLst>
       <p:ext uri="{BB962C8B-B14F-4D97-AF65-F5344CB8AC3E}">
-        <p14:creationId xmlns:p14="http://schemas.microsoft.com/office/powerpoint/2010/main" val="3274306297"/>
+        <p14:creationId xmlns:p14="http://schemas.microsoft.com/office/powerpoint/2010/main" val="1088182031"/>
       </p:ext>
     </p:extLst>
   </p:cSld>
   <p:clrMapOvr>
     <a:masterClrMapping/>
   </p:clrMapOvr>
+  <p:timing>
+    <p:tnLst>
+      <p:par>
+        <p:cTn id="1" dur="indefinite" restart="never" nodeType="tmRoot"/>
+      </p:par>
+    </p:tnLst>
+  </p:timing>
 </p:sld>
 </file>
 
@@ -5082,7 +5058,7 @@
           <p:cNvPr id="2" name="Title 1">
             <a:extLst>
               <a:ext uri="{FF2B5EF4-FFF2-40B4-BE49-F238E27FC236}">
-                <a16:creationId xmlns:a16="http://schemas.microsoft.com/office/drawing/2014/main" id="{42738043-2024-458B-971D-C4B33D773D7F}"/>
+                <a16:creationId xmlns:a16="http://schemas.microsoft.com/office/drawing/2014/main" id="{BE901AD9-752E-480C-922A-BA00B2629972}"/>
               </a:ext>
             </a:extLst>
           </p:cNvPr>
@@ -5100,7 +5076,7 @@
           <a:p>
             <a:r>
               <a:rPr lang="en-US" dirty="0"/>
-              <a:t>Mobile Application</a:t>
+              <a:t>Web Application</a:t>
             </a:r>
           </a:p>
         </p:txBody>
@@ -5110,7 +5086,7 @@
           <p:cNvPr id="3" name="Content Placeholder 2">
             <a:extLst>
               <a:ext uri="{FF2B5EF4-FFF2-40B4-BE49-F238E27FC236}">
-                <a16:creationId xmlns:a16="http://schemas.microsoft.com/office/drawing/2014/main" id="{105EE1EB-AC26-4CB8-AB02-DD3561CB2E95}"/>
+                <a16:creationId xmlns:a16="http://schemas.microsoft.com/office/drawing/2014/main" id="{6EB65DE5-FECB-4974-BD6B-58410BCEA553}"/>
               </a:ext>
             </a:extLst>
           </p:cNvPr>
@@ -5128,23 +5104,107 @@
           </a:bodyPr>
           <a:lstStyle/>
           <a:p>
-            <a:r>
-              <a:rPr lang="en-US"/>
-              <a:t>Booking a ticket:</a:t>
-            </a:r>
-          </a:p>
-        </p:txBody>
-      </p:sp>
+            <a:pPr>
+              <a:buFont typeface="Arial" panose="020B0604020202020204" pitchFamily="34" charset="0"/>
+              <a:buChar char="•"/>
+            </a:pPr>
+            <a:r>
+              <a:rPr lang="en-US" dirty="0" smtClean="0"/>
+              <a:t> Login</a:t>
+            </a:r>
+          </a:p>
+          <a:p>
+            <a:pPr>
+              <a:buFont typeface="Arial" panose="020B0604020202020204" pitchFamily="34" charset="0"/>
+              <a:buChar char="•"/>
+            </a:pPr>
+            <a:r>
+              <a:rPr lang="en-US" dirty="0" smtClean="0"/>
+              <a:t> View all coaches</a:t>
+            </a:r>
+            <a:endParaRPr lang="en-US" dirty="0"/>
+          </a:p>
+          <a:p>
+            <a:endParaRPr lang="en-US" dirty="0"/>
+          </a:p>
+        </p:txBody>
+      </p:sp>
+      <p:pic>
+        <p:nvPicPr>
+          <p:cNvPr id="6" name="Picture 6" descr="A screenshot of a social media post&#10;&#10;Description generated with very high confidence">
+            <a:extLst>
+              <a:ext uri="{FF2B5EF4-FFF2-40B4-BE49-F238E27FC236}">
+                <a16:creationId xmlns:a16="http://schemas.microsoft.com/office/drawing/2014/main" id="{C91E6366-0B6E-44DE-A68E-53E02B300221}"/>
+              </a:ext>
+            </a:extLst>
+          </p:cNvPr>
+          <p:cNvPicPr>
+            <a:picLocks noChangeAspect="1"/>
+          </p:cNvPicPr>
+          <p:nvPr/>
+        </p:nvPicPr>
+        <p:blipFill rotWithShape="1">
+          <a:blip r:embed="rId2"/>
+          <a:srcRect l="30623" t="17214" r="34355" b="30471"/>
+          <a:stretch/>
+        </p:blipFill>
+        <p:spPr>
+          <a:xfrm>
+            <a:off x="1097280" y="2842260"/>
+            <a:ext cx="2727960" cy="2196904"/>
+          </a:xfrm>
+          <a:prstGeom prst="rect">
+            <a:avLst/>
+          </a:prstGeom>
+        </p:spPr>
+      </p:pic>
+      <p:pic>
+        <p:nvPicPr>
+          <p:cNvPr id="5" name="Picture 4" descr="A screenshot of a computer&#10;&#10;Description generated with very high confidence">
+            <a:extLst>
+              <a:ext uri="{FF2B5EF4-FFF2-40B4-BE49-F238E27FC236}">
+                <a16:creationId xmlns:a16="http://schemas.microsoft.com/office/drawing/2014/main" id="{35353437-3AD2-443B-8AD9-144AC0BD2389}"/>
+              </a:ext>
+            </a:extLst>
+          </p:cNvPr>
+          <p:cNvPicPr>
+            <a:picLocks noChangeAspect="1"/>
+          </p:cNvPicPr>
+          <p:nvPr/>
+        </p:nvPicPr>
+        <p:blipFill>
+          <a:blip r:embed="rId3"/>
+          <a:stretch>
+            <a:fillRect/>
+          </a:stretch>
+        </p:blipFill>
+        <p:spPr>
+          <a:xfrm>
+            <a:off x="3994554" y="1938383"/>
+            <a:ext cx="7315464" cy="3930711"/>
+          </a:xfrm>
+          <a:prstGeom prst="rect">
+            <a:avLst/>
+          </a:prstGeom>
+        </p:spPr>
+      </p:pic>
     </p:spTree>
     <p:extLst>
       <p:ext uri="{BB962C8B-B14F-4D97-AF65-F5344CB8AC3E}">
-        <p14:creationId xmlns:p14="http://schemas.microsoft.com/office/powerpoint/2010/main" val="2469482795"/>
+        <p14:creationId xmlns:p14="http://schemas.microsoft.com/office/powerpoint/2010/main" val="2791349742"/>
       </p:ext>
     </p:extLst>
   </p:cSld>
   <p:clrMapOvr>
     <a:masterClrMapping/>
   </p:clrMapOvr>
+  <p:timing>
+    <p:tnLst>
+      <p:par>
+        <p:cTn id="1" dur="indefinite" restart="never" nodeType="tmRoot"/>
+      </p:par>
+    </p:tnLst>
+  </p:timing>
 </p:sld>
 </file>
 
@@ -5170,388 +5230,6 @@
           <p:cNvPr id="2" name="Title 1">
             <a:extLst>
               <a:ext uri="{FF2B5EF4-FFF2-40B4-BE49-F238E27FC236}">
-                <a16:creationId xmlns:a16="http://schemas.microsoft.com/office/drawing/2014/main" id="{C4CAAD65-80CD-423F-AC8A-271645B5CDBC}"/>
-              </a:ext>
-            </a:extLst>
-          </p:cNvPr>
-          <p:cNvSpPr>
-            <a:spLocks noGrp="1"/>
-          </p:cNvSpPr>
-          <p:nvPr>
-            <p:ph type="title"/>
-          </p:nvPr>
-        </p:nvSpPr>
-        <p:spPr/>
-        <p:txBody>
-          <a:bodyPr/>
-          <a:lstStyle/>
-          <a:p>
-            <a:r>
-              <a:rPr lang="en-US" dirty="0"/>
-              <a:t>Mobile Application</a:t>
-            </a:r>
-          </a:p>
-        </p:txBody>
-      </p:sp>
-      <p:sp>
-        <p:nvSpPr>
-          <p:cNvPr id="3" name="Content Placeholder 2">
-            <a:extLst>
-              <a:ext uri="{FF2B5EF4-FFF2-40B4-BE49-F238E27FC236}">
-                <a16:creationId xmlns:a16="http://schemas.microsoft.com/office/drawing/2014/main" id="{3FE96D26-E54E-4712-BDCD-19C6AA16E036}"/>
-              </a:ext>
-            </a:extLst>
-          </p:cNvPr>
-          <p:cNvSpPr>
-            <a:spLocks noGrp="1"/>
-          </p:cNvSpPr>
-          <p:nvPr>
-            <p:ph idx="1"/>
-          </p:nvPr>
-        </p:nvSpPr>
-        <p:spPr/>
-        <p:txBody>
-          <a:bodyPr vert="horz" lIns="91440" tIns="45720" rIns="91440" bIns="45720" rtlCol="0" anchor="t">
-            <a:normAutofit/>
-          </a:bodyPr>
-          <a:lstStyle/>
-          <a:p>
-            <a:r>
-              <a:rPr lang="en-US"/>
-              <a:t>Viewing bookings:</a:t>
-            </a:r>
-          </a:p>
-        </p:txBody>
-      </p:sp>
-    </p:spTree>
-    <p:extLst>
-      <p:ext uri="{BB962C8B-B14F-4D97-AF65-F5344CB8AC3E}">
-        <p14:creationId xmlns:p14="http://schemas.microsoft.com/office/powerpoint/2010/main" val="643360214"/>
-      </p:ext>
-    </p:extLst>
-  </p:cSld>
-  <p:clrMapOvr>
-    <a:masterClrMapping/>
-  </p:clrMapOvr>
-</p:sld>
-</file>
-
-<file path=ppt/slides/slide13.xml><?xml version="1.0" encoding="utf-8"?>
-<p:sld xmlns:a="http://schemas.openxmlformats.org/drawingml/2006/main" xmlns:r="http://schemas.openxmlformats.org/officeDocument/2006/relationships" xmlns:p="http://schemas.openxmlformats.org/presentationml/2006/main">
-  <p:cSld>
-    <p:spTree>
-      <p:nvGrpSpPr>
-        <p:cNvPr id="1" name=""/>
-        <p:cNvGrpSpPr/>
-        <p:nvPr/>
-      </p:nvGrpSpPr>
-      <p:grpSpPr>
-        <a:xfrm>
-          <a:off x="0" y="0"/>
-          <a:ext cx="0" cy="0"/>
-          <a:chOff x="0" y="0"/>
-          <a:chExt cx="0" cy="0"/>
-        </a:xfrm>
-      </p:grpSpPr>
-      <p:sp>
-        <p:nvSpPr>
-          <p:cNvPr id="2" name="Title 1">
-            <a:extLst>
-              <a:ext uri="{FF2B5EF4-FFF2-40B4-BE49-F238E27FC236}">
-                <a16:creationId xmlns:a16="http://schemas.microsoft.com/office/drawing/2014/main" id="{40C92198-EC00-4D49-A34A-5CD4E5A292E1}"/>
-              </a:ext>
-            </a:extLst>
-          </p:cNvPr>
-          <p:cNvSpPr>
-            <a:spLocks noGrp="1"/>
-          </p:cNvSpPr>
-          <p:nvPr>
-            <p:ph type="title"/>
-          </p:nvPr>
-        </p:nvSpPr>
-        <p:spPr/>
-        <p:txBody>
-          <a:bodyPr/>
-          <a:lstStyle/>
-          <a:p>
-            <a:r>
-              <a:rPr lang="en-US" dirty="0"/>
-              <a:t>Web Application Demonstration</a:t>
-            </a:r>
-          </a:p>
-        </p:txBody>
-      </p:sp>
-    </p:spTree>
-    <p:extLst>
-      <p:ext uri="{BB962C8B-B14F-4D97-AF65-F5344CB8AC3E}">
-        <p14:creationId xmlns:p14="http://schemas.microsoft.com/office/powerpoint/2010/main" val="1088182031"/>
-      </p:ext>
-    </p:extLst>
-  </p:cSld>
-  <p:clrMapOvr>
-    <a:masterClrMapping/>
-  </p:clrMapOvr>
-</p:sld>
-</file>
-
-<file path=ppt/slides/slide14.xml><?xml version="1.0" encoding="utf-8"?>
-<p:sld xmlns:a="http://schemas.openxmlformats.org/drawingml/2006/main" xmlns:r="http://schemas.openxmlformats.org/officeDocument/2006/relationships" xmlns:p="http://schemas.openxmlformats.org/presentationml/2006/main">
-  <p:cSld>
-    <p:spTree>
-      <p:nvGrpSpPr>
-        <p:cNvPr id="1" name=""/>
-        <p:cNvGrpSpPr/>
-        <p:nvPr/>
-      </p:nvGrpSpPr>
-      <p:grpSpPr>
-        <a:xfrm>
-          <a:off x="0" y="0"/>
-          <a:ext cx="0" cy="0"/>
-          <a:chOff x="0" y="0"/>
-          <a:chExt cx="0" cy="0"/>
-        </a:xfrm>
-      </p:grpSpPr>
-      <p:sp>
-        <p:nvSpPr>
-          <p:cNvPr id="2" name="Title 1">
-            <a:extLst>
-              <a:ext uri="{FF2B5EF4-FFF2-40B4-BE49-F238E27FC236}">
-                <a16:creationId xmlns:a16="http://schemas.microsoft.com/office/drawing/2014/main" id="{BE901AD9-752E-480C-922A-BA00B2629972}"/>
-              </a:ext>
-            </a:extLst>
-          </p:cNvPr>
-          <p:cNvSpPr>
-            <a:spLocks noGrp="1"/>
-          </p:cNvSpPr>
-          <p:nvPr>
-            <p:ph type="title"/>
-          </p:nvPr>
-        </p:nvSpPr>
-        <p:spPr/>
-        <p:txBody>
-          <a:bodyPr/>
-          <a:lstStyle/>
-          <a:p>
-            <a:r>
-              <a:rPr lang="en-US" dirty="0"/>
-              <a:t>Web Application</a:t>
-            </a:r>
-          </a:p>
-        </p:txBody>
-      </p:sp>
-      <p:sp>
-        <p:nvSpPr>
-          <p:cNvPr id="3" name="Content Placeholder 2">
-            <a:extLst>
-              <a:ext uri="{FF2B5EF4-FFF2-40B4-BE49-F238E27FC236}">
-                <a16:creationId xmlns:a16="http://schemas.microsoft.com/office/drawing/2014/main" id="{6EB65DE5-FECB-4974-BD6B-58410BCEA553}"/>
-              </a:ext>
-            </a:extLst>
-          </p:cNvPr>
-          <p:cNvSpPr>
-            <a:spLocks noGrp="1"/>
-          </p:cNvSpPr>
-          <p:nvPr>
-            <p:ph idx="1"/>
-          </p:nvPr>
-        </p:nvSpPr>
-        <p:spPr/>
-        <p:txBody>
-          <a:bodyPr vert="horz" lIns="91440" tIns="45720" rIns="91440" bIns="45720" rtlCol="0" anchor="t">
-            <a:normAutofit/>
-          </a:bodyPr>
-          <a:lstStyle/>
-          <a:p>
-            <a:r>
-              <a:rPr lang="en-US"/>
-              <a:t>Logging in:</a:t>
-            </a:r>
-          </a:p>
-        </p:txBody>
-      </p:sp>
-      <p:pic>
-        <p:nvPicPr>
-          <p:cNvPr id="6" name="Picture 6" descr="A screenshot of a social media post&#10;&#10;Description generated with very high confidence">
-            <a:extLst>
-              <a:ext uri="{FF2B5EF4-FFF2-40B4-BE49-F238E27FC236}">
-                <a16:creationId xmlns:a16="http://schemas.microsoft.com/office/drawing/2014/main" id="{C91E6366-0B6E-44DE-A68E-53E02B300221}"/>
-              </a:ext>
-            </a:extLst>
-          </p:cNvPr>
-          <p:cNvPicPr>
-            <a:picLocks noChangeAspect="1"/>
-          </p:cNvPicPr>
-          <p:nvPr/>
-        </p:nvPicPr>
-        <p:blipFill>
-          <a:blip r:embed="rId2"/>
-          <a:stretch>
-            <a:fillRect/>
-          </a:stretch>
-        </p:blipFill>
-        <p:spPr>
-          <a:xfrm>
-            <a:off x="3360234" y="1804640"/>
-            <a:ext cx="7789126" cy="4199362"/>
-          </a:xfrm>
-          <a:prstGeom prst="rect">
-            <a:avLst/>
-          </a:prstGeom>
-        </p:spPr>
-      </p:pic>
-    </p:spTree>
-    <p:extLst>
-      <p:ext uri="{BB962C8B-B14F-4D97-AF65-F5344CB8AC3E}">
-        <p14:creationId xmlns:p14="http://schemas.microsoft.com/office/powerpoint/2010/main" val="2791349742"/>
-      </p:ext>
-    </p:extLst>
-  </p:cSld>
-  <p:clrMapOvr>
-    <a:masterClrMapping/>
-  </p:clrMapOvr>
-</p:sld>
-</file>
-
-<file path=ppt/slides/slide15.xml><?xml version="1.0" encoding="utf-8"?>
-<p:sld xmlns:a="http://schemas.openxmlformats.org/drawingml/2006/main" xmlns:r="http://schemas.openxmlformats.org/officeDocument/2006/relationships" xmlns:p="http://schemas.openxmlformats.org/presentationml/2006/main">
-  <p:cSld>
-    <p:spTree>
-      <p:nvGrpSpPr>
-        <p:cNvPr id="1" name=""/>
-        <p:cNvGrpSpPr/>
-        <p:nvPr/>
-      </p:nvGrpSpPr>
-      <p:grpSpPr>
-        <a:xfrm>
-          <a:off x="0" y="0"/>
-          <a:ext cx="0" cy="0"/>
-          <a:chOff x="0" y="0"/>
-          <a:chExt cx="0" cy="0"/>
-        </a:xfrm>
-      </p:grpSpPr>
-      <p:sp>
-        <p:nvSpPr>
-          <p:cNvPr id="2" name="Title 1">
-            <a:extLst>
-              <a:ext uri="{FF2B5EF4-FFF2-40B4-BE49-F238E27FC236}">
-                <a16:creationId xmlns:a16="http://schemas.microsoft.com/office/drawing/2014/main" id="{181FCE6F-3A44-4C61-8008-82A517D0FE3E}"/>
-              </a:ext>
-            </a:extLst>
-          </p:cNvPr>
-          <p:cNvSpPr>
-            <a:spLocks noGrp="1"/>
-          </p:cNvSpPr>
-          <p:nvPr>
-            <p:ph type="title"/>
-          </p:nvPr>
-        </p:nvSpPr>
-        <p:spPr/>
-        <p:txBody>
-          <a:bodyPr/>
-          <a:lstStyle/>
-          <a:p>
-            <a:r>
-              <a:rPr lang="en-US" dirty="0"/>
-              <a:t>Web Application</a:t>
-            </a:r>
-          </a:p>
-        </p:txBody>
-      </p:sp>
-      <p:sp>
-        <p:nvSpPr>
-          <p:cNvPr id="3" name="Content Placeholder 2">
-            <a:extLst>
-              <a:ext uri="{FF2B5EF4-FFF2-40B4-BE49-F238E27FC236}">
-                <a16:creationId xmlns:a16="http://schemas.microsoft.com/office/drawing/2014/main" id="{D98B83F6-8DDD-438B-B944-99EBA9134F5A}"/>
-              </a:ext>
-            </a:extLst>
-          </p:cNvPr>
-          <p:cNvSpPr>
-            <a:spLocks noGrp="1"/>
-          </p:cNvSpPr>
-          <p:nvPr>
-            <p:ph idx="1"/>
-          </p:nvPr>
-        </p:nvSpPr>
-        <p:spPr/>
-        <p:txBody>
-          <a:bodyPr vert="horz" lIns="91440" tIns="45720" rIns="91440" bIns="45720" rtlCol="0" anchor="t">
-            <a:normAutofit/>
-          </a:bodyPr>
-          <a:lstStyle/>
-          <a:p>
-            <a:r>
-              <a:rPr lang="en-US"/>
-              <a:t>Viewing current coaches:</a:t>
-            </a:r>
-          </a:p>
-        </p:txBody>
-      </p:sp>
-      <p:pic>
-        <p:nvPicPr>
-          <p:cNvPr id="4" name="Picture 4" descr="A screenshot of a computer&#10;&#10;Description generated with very high confidence">
-            <a:extLst>
-              <a:ext uri="{FF2B5EF4-FFF2-40B4-BE49-F238E27FC236}">
-                <a16:creationId xmlns:a16="http://schemas.microsoft.com/office/drawing/2014/main" id="{35353437-3AD2-443B-8AD9-144AC0BD2389}"/>
-              </a:ext>
-            </a:extLst>
-          </p:cNvPr>
-          <p:cNvPicPr>
-            <a:picLocks noChangeAspect="1"/>
-          </p:cNvPicPr>
-          <p:nvPr/>
-        </p:nvPicPr>
-        <p:blipFill>
-          <a:blip r:embed="rId2"/>
-          <a:stretch>
-            <a:fillRect/>
-          </a:stretch>
-        </p:blipFill>
-        <p:spPr>
-          <a:xfrm>
-            <a:off x="3971694" y="1951929"/>
-            <a:ext cx="7296615" cy="3920583"/>
-          </a:xfrm>
-          <a:prstGeom prst="rect">
-            <a:avLst/>
-          </a:prstGeom>
-        </p:spPr>
-      </p:pic>
-    </p:spTree>
-    <p:extLst>
-      <p:ext uri="{BB962C8B-B14F-4D97-AF65-F5344CB8AC3E}">
-        <p14:creationId xmlns:p14="http://schemas.microsoft.com/office/powerpoint/2010/main" val="647617278"/>
-      </p:ext>
-    </p:extLst>
-  </p:cSld>
-  <p:clrMapOvr>
-    <a:masterClrMapping/>
-  </p:clrMapOvr>
-</p:sld>
-</file>
-
-<file path=ppt/slides/slide16.xml><?xml version="1.0" encoding="utf-8"?>
-<p:sld xmlns:a="http://schemas.openxmlformats.org/drawingml/2006/main" xmlns:r="http://schemas.openxmlformats.org/officeDocument/2006/relationships" xmlns:p="http://schemas.openxmlformats.org/presentationml/2006/main">
-  <p:cSld>
-    <p:spTree>
-      <p:nvGrpSpPr>
-        <p:cNvPr id="1" name=""/>
-        <p:cNvGrpSpPr/>
-        <p:nvPr/>
-      </p:nvGrpSpPr>
-      <p:grpSpPr>
-        <a:xfrm>
-          <a:off x="0" y="0"/>
-          <a:ext cx="0" cy="0"/>
-          <a:chOff x="0" y="0"/>
-          <a:chExt cx="0" cy="0"/>
-        </a:xfrm>
-      </p:grpSpPr>
-      <p:sp>
-        <p:nvSpPr>
-          <p:cNvPr id="2" name="Title 1">
-            <a:extLst>
-              <a:ext uri="{FF2B5EF4-FFF2-40B4-BE49-F238E27FC236}">
                 <a16:creationId xmlns:a16="http://schemas.microsoft.com/office/drawing/2014/main" id="{42738043-2024-458B-971D-C4B33D773D7F}"/>
               </a:ext>
             </a:extLst>
@@ -5598,10 +5276,40 @@
           </a:bodyPr>
           <a:lstStyle/>
           <a:p>
-            <a:r>
-              <a:rPr lang="en-US"/>
-              <a:t>Creating a coach record:</a:t>
-            </a:r>
+            <a:pPr>
+              <a:buFont typeface="Arial" panose="020B0604020202020204" pitchFamily="34" charset="0"/>
+              <a:buChar char="•"/>
+            </a:pPr>
+            <a:r>
+              <a:rPr lang="en-US" dirty="0" smtClean="0"/>
+              <a:t> Create new coach record</a:t>
+            </a:r>
+          </a:p>
+          <a:p>
+            <a:pPr>
+              <a:buFont typeface="Arial" panose="020B0604020202020204" pitchFamily="34" charset="0"/>
+              <a:buChar char="•"/>
+            </a:pPr>
+            <a:r>
+              <a:rPr lang="en-US" dirty="0" smtClean="0"/>
+              <a:t> Edit </a:t>
+            </a:r>
+            <a:r>
+              <a:rPr lang="en-US" dirty="0"/>
+              <a:t>coach </a:t>
+            </a:r>
+            <a:r>
+              <a:rPr lang="en-US" dirty="0" smtClean="0"/>
+              <a:t>capacity</a:t>
+            </a:r>
+            <a:endParaRPr lang="en-US" dirty="0" smtClean="0"/>
+          </a:p>
+          <a:p>
+            <a:pPr>
+              <a:buFont typeface="Arial" panose="020B0604020202020204" pitchFamily="34" charset="0"/>
+              <a:buChar char="•"/>
+            </a:pPr>
+            <a:endParaRPr lang="en-US" dirty="0"/>
           </a:p>
         </p:txBody>
       </p:sp>
@@ -5621,13 +5329,13 @@
         </p:nvPicPr>
         <p:blipFill rotWithShape="1">
           <a:blip r:embed="rId2"/>
-          <a:srcRect r="45743" b="12941"/>
+          <a:srcRect r="57399" b="28171"/>
           <a:stretch/>
         </p:blipFill>
         <p:spPr>
           <a:xfrm>
-            <a:off x="1137423" y="2314344"/>
-            <a:ext cx="3966758" cy="3442878"/>
+            <a:off x="1160283" y="2770810"/>
+            <a:ext cx="3114537" cy="2840566"/>
           </a:xfrm>
           <a:prstGeom prst="rect">
             <a:avLst/>
@@ -5656,8 +5364,67 @@
         </p:blipFill>
         <p:spPr>
           <a:xfrm>
-            <a:off x="5142571" y="2310706"/>
+            <a:off x="288631" y="5628730"/>
             <a:ext cx="6785517" cy="489564"/>
+          </a:xfrm>
+          <a:prstGeom prst="rect">
+            <a:avLst/>
+          </a:prstGeom>
+        </p:spPr>
+      </p:pic>
+      <p:pic>
+        <p:nvPicPr>
+          <p:cNvPr id="7" name="Picture 4" descr="A screenshot of a cell phone&#10;&#10;Description generated with very high confidence">
+            <a:extLst>
+              <a:ext uri="{FF2B5EF4-FFF2-40B4-BE49-F238E27FC236}">
+                <a16:creationId xmlns:a16="http://schemas.microsoft.com/office/drawing/2014/main" id="{51544FD2-5184-47FD-8933-207372A3D4EE}"/>
+              </a:ext>
+            </a:extLst>
+          </p:cNvPr>
+          <p:cNvPicPr>
+            <a:picLocks noChangeAspect="1"/>
+          </p:cNvPicPr>
+          <p:nvPr/>
+        </p:nvPicPr>
+        <p:blipFill rotWithShape="1">
+          <a:blip r:embed="rId4"/>
+          <a:srcRect l="-481" t="-886" r="62526" b="18918"/>
+          <a:stretch/>
+        </p:blipFill>
+        <p:spPr>
+          <a:xfrm>
+            <a:off x="7338432" y="2276171"/>
+            <a:ext cx="3005718" cy="3434926"/>
+          </a:xfrm>
+          <a:prstGeom prst="rect">
+            <a:avLst/>
+          </a:prstGeom>
+        </p:spPr>
+      </p:pic>
+      <p:pic>
+        <p:nvPicPr>
+          <p:cNvPr id="9" name="Picture 6" descr="A screenshot of a cell phone&#10;&#10;Description generated with high confidence">
+            <a:extLst>
+              <a:ext uri="{FF2B5EF4-FFF2-40B4-BE49-F238E27FC236}">
+                <a16:creationId xmlns:a16="http://schemas.microsoft.com/office/drawing/2014/main" id="{53C6CB9A-993D-40BF-AA34-5F4CB92BD9F8}"/>
+              </a:ext>
+            </a:extLst>
+          </p:cNvPr>
+          <p:cNvPicPr>
+            <a:picLocks noChangeAspect="1"/>
+          </p:cNvPicPr>
+          <p:nvPr/>
+        </p:nvPicPr>
+        <p:blipFill>
+          <a:blip r:embed="rId5"/>
+          <a:stretch>
+            <a:fillRect/>
+          </a:stretch>
+        </p:blipFill>
+        <p:spPr>
+          <a:xfrm>
+            <a:off x="4709532" y="1754714"/>
+            <a:ext cx="7150677" cy="413083"/>
           </a:xfrm>
           <a:prstGeom prst="rect">
             <a:avLst/>
@@ -5674,10 +5441,17 @@
   <p:clrMapOvr>
     <a:masterClrMapping/>
   </p:clrMapOvr>
+  <p:timing>
+    <p:tnLst>
+      <p:par>
+        <p:cTn id="1" dur="indefinite" restart="never" nodeType="tmRoot"/>
+      </p:par>
+    </p:tnLst>
+  </p:timing>
 </p:sld>
 </file>
 
-<file path=ppt/slides/slide17.xml><?xml version="1.0" encoding="utf-8"?>
+<file path=ppt/slides/slide13.xml><?xml version="1.0" encoding="utf-8"?>
 <p:sld xmlns:a="http://schemas.openxmlformats.org/drawingml/2006/main" xmlns:r="http://schemas.openxmlformats.org/officeDocument/2006/relationships" xmlns:p="http://schemas.openxmlformats.org/presentationml/2006/main">
   <p:cSld>
     <p:spTree>
@@ -5745,157 +5519,23 @@
           </a:bodyPr>
           <a:lstStyle/>
           <a:p>
-            <a:r>
-              <a:rPr lang="en-US"/>
-              <a:t>Edit coach capacity:</a:t>
-            </a:r>
-          </a:p>
-        </p:txBody>
-      </p:sp>
-      <p:pic>
-        <p:nvPicPr>
-          <p:cNvPr id="4" name="Picture 4" descr="A screenshot of a cell phone&#10;&#10;Description generated with very high confidence">
-            <a:extLst>
-              <a:ext uri="{FF2B5EF4-FFF2-40B4-BE49-F238E27FC236}">
-                <a16:creationId xmlns:a16="http://schemas.microsoft.com/office/drawing/2014/main" id="{51544FD2-5184-47FD-8933-207372A3D4EE}"/>
-              </a:ext>
-            </a:extLst>
-          </p:cNvPr>
-          <p:cNvPicPr>
-            <a:picLocks noChangeAspect="1"/>
-          </p:cNvPicPr>
-          <p:nvPr/>
-        </p:nvPicPr>
-        <p:blipFill rotWithShape="1">
-          <a:blip r:embed="rId2"/>
-          <a:srcRect r="54426" b="14085"/>
-          <a:stretch/>
-        </p:blipFill>
-        <p:spPr>
-          <a:xfrm>
-            <a:off x="982406" y="2358061"/>
-            <a:ext cx="3609092" cy="3695726"/>
-          </a:xfrm>
-          <a:prstGeom prst="rect">
-            <a:avLst/>
-          </a:prstGeom>
-        </p:spPr>
-      </p:pic>
-      <p:pic>
-        <p:nvPicPr>
-          <p:cNvPr id="6" name="Picture 6" descr="A screenshot of a cell phone&#10;&#10;Description generated with high confidence">
-            <a:extLst>
-              <a:ext uri="{FF2B5EF4-FFF2-40B4-BE49-F238E27FC236}">
-                <a16:creationId xmlns:a16="http://schemas.microsoft.com/office/drawing/2014/main" id="{53C6CB9A-993D-40BF-AA34-5F4CB92BD9F8}"/>
-              </a:ext>
-            </a:extLst>
-          </p:cNvPr>
-          <p:cNvPicPr>
-            <a:picLocks noChangeAspect="1"/>
-          </p:cNvPicPr>
-          <p:nvPr/>
-        </p:nvPicPr>
-        <p:blipFill>
-          <a:blip r:embed="rId3"/>
-          <a:stretch>
-            <a:fillRect/>
-          </a:stretch>
-        </p:blipFill>
-        <p:spPr>
-          <a:xfrm>
-            <a:off x="4724400" y="2360879"/>
-            <a:ext cx="7150677" cy="413083"/>
-          </a:xfrm>
-          <a:prstGeom prst="rect">
-            <a:avLst/>
-          </a:prstGeom>
-        </p:spPr>
-      </p:pic>
-    </p:spTree>
-    <p:extLst>
-      <p:ext uri="{BB962C8B-B14F-4D97-AF65-F5344CB8AC3E}">
-        <p14:creationId xmlns:p14="http://schemas.microsoft.com/office/powerpoint/2010/main" val="3477466875"/>
-      </p:ext>
-    </p:extLst>
-  </p:cSld>
-  <p:clrMapOvr>
-    <a:masterClrMapping/>
-  </p:clrMapOvr>
-</p:sld>
-</file>
-
-<file path=ppt/slides/slide18.xml><?xml version="1.0" encoding="utf-8"?>
-<p:sld xmlns:a="http://schemas.openxmlformats.org/drawingml/2006/main" xmlns:r="http://schemas.openxmlformats.org/officeDocument/2006/relationships" xmlns:p="http://schemas.openxmlformats.org/presentationml/2006/main">
-  <p:cSld>
-    <p:spTree>
-      <p:nvGrpSpPr>
-        <p:cNvPr id="1" name=""/>
-        <p:cNvGrpSpPr/>
-        <p:nvPr/>
-      </p:nvGrpSpPr>
-      <p:grpSpPr>
-        <a:xfrm>
-          <a:off x="0" y="0"/>
-          <a:ext cx="0" cy="0"/>
-          <a:chOff x="0" y="0"/>
-          <a:chExt cx="0" cy="0"/>
-        </a:xfrm>
-      </p:grpSpPr>
-      <p:sp>
-        <p:nvSpPr>
-          <p:cNvPr id="2" name="Title 1">
-            <a:extLst>
-              <a:ext uri="{FF2B5EF4-FFF2-40B4-BE49-F238E27FC236}">
-                <a16:creationId xmlns:a16="http://schemas.microsoft.com/office/drawing/2014/main" id="{C4CAAD65-80CD-423F-AC8A-271645B5CDBC}"/>
-              </a:ext>
-            </a:extLst>
-          </p:cNvPr>
-          <p:cNvSpPr>
-            <a:spLocks noGrp="1"/>
-          </p:cNvSpPr>
-          <p:nvPr>
-            <p:ph type="title"/>
-          </p:nvPr>
-        </p:nvSpPr>
-        <p:spPr/>
-        <p:txBody>
-          <a:bodyPr/>
-          <a:lstStyle/>
-          <a:p>
-            <a:r>
-              <a:rPr lang="en-US" dirty="0"/>
-              <a:t>Web Application</a:t>
-            </a:r>
-          </a:p>
-        </p:txBody>
-      </p:sp>
-      <p:sp>
-        <p:nvSpPr>
-          <p:cNvPr id="3" name="Content Placeholder 2">
-            <a:extLst>
-              <a:ext uri="{FF2B5EF4-FFF2-40B4-BE49-F238E27FC236}">
-                <a16:creationId xmlns:a16="http://schemas.microsoft.com/office/drawing/2014/main" id="{3FE96D26-E54E-4712-BDCD-19C6AA16E036}"/>
-              </a:ext>
-            </a:extLst>
-          </p:cNvPr>
-          <p:cNvSpPr>
-            <a:spLocks noGrp="1"/>
-          </p:cNvSpPr>
-          <p:nvPr>
-            <p:ph idx="1"/>
-          </p:nvPr>
-        </p:nvSpPr>
-        <p:spPr/>
-        <p:txBody>
-          <a:bodyPr vert="horz" lIns="91440" tIns="45720" rIns="91440" bIns="45720" rtlCol="0" anchor="t">
-            <a:normAutofit/>
-          </a:bodyPr>
-          <a:lstStyle/>
-          <a:p>
-            <a:r>
-              <a:rPr lang="en-US"/>
-              <a:t>Delete a coach record:</a:t>
-            </a:r>
+            <a:pPr>
+              <a:buFont typeface="Arial" panose="020B0604020202020204" pitchFamily="34" charset="0"/>
+              <a:buChar char="•"/>
+            </a:pPr>
+            <a:r>
+              <a:rPr lang="en-US" dirty="0" smtClean="0"/>
+              <a:t> Delete </a:t>
+            </a:r>
+            <a:r>
+              <a:rPr lang="en-US" dirty="0"/>
+              <a:t>a coach </a:t>
+            </a:r>
+            <a:r>
+              <a:rPr lang="en-US" dirty="0" smtClean="0"/>
+              <a:t>record</a:t>
+            </a:r>
+            <a:endParaRPr lang="en-US" dirty="0"/>
           </a:p>
         </p:txBody>
       </p:sp>
@@ -5920,7 +5560,7 @@
         </p:blipFill>
         <p:spPr>
           <a:xfrm>
-            <a:off x="3979718" y="2120464"/>
+            <a:off x="3964478" y="2075471"/>
             <a:ext cx="3773805" cy="3901997"/>
           </a:xfrm>
           <a:prstGeom prst="rect">
@@ -5938,10 +5578,17 @@
   <p:clrMapOvr>
     <a:masterClrMapping/>
   </p:clrMapOvr>
+  <p:timing>
+    <p:tnLst>
+      <p:par>
+        <p:cTn id="1" dur="indefinite" restart="never" nodeType="tmRoot"/>
+      </p:par>
+    </p:tnLst>
+  </p:timing>
 </p:sld>
 </file>
 
-<file path=ppt/slides/slide19.xml><?xml version="1.0" encoding="utf-8"?>
+<file path=ppt/slides/slide14.xml><?xml version="1.0" encoding="utf-8"?>
 <p:sld xmlns:a="http://schemas.openxmlformats.org/drawingml/2006/main" xmlns:r="http://schemas.openxmlformats.org/officeDocument/2006/relationships" xmlns:p="http://schemas.openxmlformats.org/presentationml/2006/main">
   <p:cSld>
     <p:spTree>
@@ -5996,6 +5643,575 @@
   <p:clrMapOvr>
     <a:masterClrMapping/>
   </p:clrMapOvr>
+  <p:timing>
+    <p:tnLst>
+      <p:par>
+        <p:cTn id="1" dur="indefinite" restart="never" nodeType="tmRoot"/>
+      </p:par>
+    </p:tnLst>
+  </p:timing>
+</p:sld>
+</file>
+
+<file path=ppt/slides/slide15.xml><?xml version="1.0" encoding="utf-8"?>
+<p:sld xmlns:a="http://schemas.openxmlformats.org/drawingml/2006/main" xmlns:r="http://schemas.openxmlformats.org/officeDocument/2006/relationships" xmlns:p="http://schemas.openxmlformats.org/presentationml/2006/main">
+  <p:cSld>
+    <p:spTree>
+      <p:nvGrpSpPr>
+        <p:cNvPr id="1" name=""/>
+        <p:cNvGrpSpPr/>
+        <p:nvPr/>
+      </p:nvGrpSpPr>
+      <p:grpSpPr>
+        <a:xfrm>
+          <a:off x="0" y="0"/>
+          <a:ext cx="0" cy="0"/>
+          <a:chOff x="0" y="0"/>
+          <a:chExt cx="0" cy="0"/>
+        </a:xfrm>
+      </p:grpSpPr>
+      <p:sp>
+        <p:nvSpPr>
+          <p:cNvPr id="2" name="Title 1">
+            <a:extLst>
+              <a:ext uri="{FF2B5EF4-FFF2-40B4-BE49-F238E27FC236}">
+                <a16:creationId xmlns:a16="http://schemas.microsoft.com/office/drawing/2014/main" id="{BE901AD9-752E-480C-922A-BA00B2629972}"/>
+              </a:ext>
+            </a:extLst>
+          </p:cNvPr>
+          <p:cNvSpPr>
+            <a:spLocks noGrp="1"/>
+          </p:cNvSpPr>
+          <p:nvPr>
+            <p:ph type="title"/>
+          </p:nvPr>
+        </p:nvSpPr>
+        <p:spPr/>
+        <p:txBody>
+          <a:bodyPr/>
+          <a:lstStyle/>
+          <a:p>
+            <a:r>
+              <a:rPr lang="en-US" dirty="0"/>
+              <a:t>Desktop Application</a:t>
+            </a:r>
+          </a:p>
+        </p:txBody>
+      </p:sp>
+      <p:sp>
+        <p:nvSpPr>
+          <p:cNvPr id="3" name="Content Placeholder 2">
+            <a:extLst>
+              <a:ext uri="{FF2B5EF4-FFF2-40B4-BE49-F238E27FC236}">
+                <a16:creationId xmlns:a16="http://schemas.microsoft.com/office/drawing/2014/main" id="{6EB65DE5-FECB-4974-BD6B-58410BCEA553}"/>
+              </a:ext>
+            </a:extLst>
+          </p:cNvPr>
+          <p:cNvSpPr>
+            <a:spLocks noGrp="1"/>
+          </p:cNvSpPr>
+          <p:nvPr>
+            <p:ph idx="1"/>
+          </p:nvPr>
+        </p:nvSpPr>
+        <p:spPr/>
+        <p:txBody>
+          <a:bodyPr vert="horz" lIns="91440" tIns="45720" rIns="91440" bIns="45720" rtlCol="0" anchor="t">
+            <a:normAutofit/>
+          </a:bodyPr>
+          <a:lstStyle/>
+          <a:p>
+            <a:pPr>
+              <a:buFont typeface="Arial" panose="020B0604020202020204" pitchFamily="34" charset="0"/>
+              <a:buChar char="•"/>
+            </a:pPr>
+            <a:r>
+              <a:rPr lang="en-US" dirty="0" smtClean="0"/>
+              <a:t> Login</a:t>
+            </a:r>
+          </a:p>
+          <a:p>
+            <a:pPr>
+              <a:buFont typeface="Arial" panose="020B0604020202020204" pitchFamily="34" charset="0"/>
+              <a:buChar char="•"/>
+            </a:pPr>
+            <a:r>
+              <a:rPr lang="en-US" dirty="0"/>
+              <a:t> </a:t>
+            </a:r>
+            <a:r>
+              <a:rPr lang="en-US" dirty="0" smtClean="0"/>
+              <a:t>Select a shift</a:t>
+            </a:r>
+          </a:p>
+          <a:p>
+            <a:pPr marL="0" indent="0">
+              <a:buNone/>
+            </a:pPr>
+            <a:endParaRPr lang="en-US" dirty="0"/>
+          </a:p>
+        </p:txBody>
+      </p:sp>
+      <p:pic>
+        <p:nvPicPr>
+          <p:cNvPr id="6" name="Picture 6" descr="A screenshot of a cell phone&#10;&#10;Description generated with very high confidence">
+            <a:extLst>
+              <a:ext uri="{FF2B5EF4-FFF2-40B4-BE49-F238E27FC236}">
+                <a16:creationId xmlns:a16="http://schemas.microsoft.com/office/drawing/2014/main" id="{31291D5F-7328-423C-942D-2CD92015CA26}"/>
+              </a:ext>
+            </a:extLst>
+          </p:cNvPr>
+          <p:cNvPicPr>
+            <a:picLocks noChangeAspect="1"/>
+          </p:cNvPicPr>
+          <p:nvPr/>
+        </p:nvPicPr>
+        <p:blipFill rotWithShape="1">
+          <a:blip r:embed="rId2"/>
+          <a:srcRect l="30620" t="29534" r="36529" b="21734"/>
+          <a:stretch/>
+        </p:blipFill>
+        <p:spPr>
+          <a:xfrm>
+            <a:off x="1917218" y="2866293"/>
+            <a:ext cx="3175286" cy="2542149"/>
+          </a:xfrm>
+          <a:prstGeom prst="rect">
+            <a:avLst/>
+          </a:prstGeom>
+        </p:spPr>
+      </p:pic>
+      <p:pic>
+        <p:nvPicPr>
+          <p:cNvPr id="5" name="Picture 4" descr="A screenshot of a cell phone&#10;&#10;Description generated with very high confidence">
+            <a:extLst>
+              <a:ext uri="{FF2B5EF4-FFF2-40B4-BE49-F238E27FC236}">
+                <a16:creationId xmlns:a16="http://schemas.microsoft.com/office/drawing/2014/main" id="{D4D81E0C-8014-43A4-9836-5941EC9DC7D9}"/>
+              </a:ext>
+            </a:extLst>
+          </p:cNvPr>
+          <p:cNvPicPr>
+            <a:picLocks noChangeAspect="1"/>
+          </p:cNvPicPr>
+          <p:nvPr/>
+        </p:nvPicPr>
+        <p:blipFill rotWithShape="1">
+          <a:blip r:embed="rId3"/>
+          <a:srcRect l="24711" t="28082" r="21540" b="23138"/>
+          <a:stretch/>
+        </p:blipFill>
+        <p:spPr>
+          <a:xfrm>
+            <a:off x="5763751" y="2708031"/>
+            <a:ext cx="5991367" cy="3049757"/>
+          </a:xfrm>
+          <a:prstGeom prst="rect">
+            <a:avLst/>
+          </a:prstGeom>
+        </p:spPr>
+      </p:pic>
+    </p:spTree>
+    <p:extLst>
+      <p:ext uri="{BB962C8B-B14F-4D97-AF65-F5344CB8AC3E}">
+        <p14:creationId xmlns:p14="http://schemas.microsoft.com/office/powerpoint/2010/main" val="3447251603"/>
+      </p:ext>
+    </p:extLst>
+  </p:cSld>
+  <p:clrMapOvr>
+    <a:masterClrMapping/>
+  </p:clrMapOvr>
+  <p:timing>
+    <p:tnLst>
+      <p:par>
+        <p:cTn id="1" dur="indefinite" restart="never" nodeType="tmRoot"/>
+      </p:par>
+    </p:tnLst>
+  </p:timing>
+</p:sld>
+</file>
+
+<file path=ppt/slides/slide16.xml><?xml version="1.0" encoding="utf-8"?>
+<p:sld xmlns:a="http://schemas.openxmlformats.org/drawingml/2006/main" xmlns:r="http://schemas.openxmlformats.org/officeDocument/2006/relationships" xmlns:p="http://schemas.openxmlformats.org/presentationml/2006/main">
+  <p:cSld>
+    <p:spTree>
+      <p:nvGrpSpPr>
+        <p:cNvPr id="1" name=""/>
+        <p:cNvGrpSpPr/>
+        <p:nvPr/>
+      </p:nvGrpSpPr>
+      <p:grpSpPr>
+        <a:xfrm>
+          <a:off x="0" y="0"/>
+          <a:ext cx="0" cy="0"/>
+          <a:chOff x="0" y="0"/>
+          <a:chExt cx="0" cy="0"/>
+        </a:xfrm>
+      </p:grpSpPr>
+      <p:sp>
+        <p:nvSpPr>
+          <p:cNvPr id="2" name="Title 1">
+            <a:extLst>
+              <a:ext uri="{FF2B5EF4-FFF2-40B4-BE49-F238E27FC236}">
+                <a16:creationId xmlns:a16="http://schemas.microsoft.com/office/drawing/2014/main" id="{42738043-2024-458B-971D-C4B33D773D7F}"/>
+              </a:ext>
+            </a:extLst>
+          </p:cNvPr>
+          <p:cNvSpPr>
+            <a:spLocks noGrp="1"/>
+          </p:cNvSpPr>
+          <p:nvPr>
+            <p:ph type="title"/>
+          </p:nvPr>
+        </p:nvSpPr>
+        <p:spPr/>
+        <p:txBody>
+          <a:bodyPr/>
+          <a:lstStyle/>
+          <a:p>
+            <a:r>
+              <a:rPr lang="en-US" dirty="0"/>
+              <a:t>Desktop Application</a:t>
+            </a:r>
+          </a:p>
+        </p:txBody>
+      </p:sp>
+      <p:sp>
+        <p:nvSpPr>
+          <p:cNvPr id="3" name="Content Placeholder 2">
+            <a:extLst>
+              <a:ext uri="{FF2B5EF4-FFF2-40B4-BE49-F238E27FC236}">
+                <a16:creationId xmlns:a16="http://schemas.microsoft.com/office/drawing/2014/main" id="{105EE1EB-AC26-4CB8-AB02-DD3561CB2E95}"/>
+              </a:ext>
+            </a:extLst>
+          </p:cNvPr>
+          <p:cNvSpPr>
+            <a:spLocks noGrp="1"/>
+          </p:cNvSpPr>
+          <p:nvPr>
+            <p:ph idx="1"/>
+          </p:nvPr>
+        </p:nvSpPr>
+        <p:spPr/>
+        <p:txBody>
+          <a:bodyPr vert="horz" lIns="91440" tIns="45720" rIns="91440" bIns="45720" rtlCol="0" anchor="t">
+            <a:normAutofit/>
+          </a:bodyPr>
+          <a:lstStyle/>
+          <a:p>
+            <a:pPr>
+              <a:buFont typeface="Arial" panose="020B0604020202020204" pitchFamily="34" charset="0"/>
+              <a:buChar char="•"/>
+            </a:pPr>
+            <a:r>
+              <a:rPr lang="en-US" dirty="0" smtClean="0"/>
+              <a:t> View Stops</a:t>
+            </a:r>
+            <a:endParaRPr lang="en-US" dirty="0"/>
+          </a:p>
+        </p:txBody>
+      </p:sp>
+      <p:pic>
+        <p:nvPicPr>
+          <p:cNvPr id="4" name="Picture 3"/>
+          <p:cNvPicPr>
+            <a:picLocks noChangeAspect="1"/>
+          </p:cNvPicPr>
+          <p:nvPr/>
+        </p:nvPicPr>
+        <p:blipFill rotWithShape="1">
+          <a:blip r:embed="rId2"/>
+          <a:srcRect b="4640"/>
+          <a:stretch/>
+        </p:blipFill>
+        <p:spPr>
+          <a:xfrm>
+            <a:off x="3613249" y="1845734"/>
+            <a:ext cx="8186028" cy="4390970"/>
+          </a:xfrm>
+          <a:prstGeom prst="rect">
+            <a:avLst/>
+          </a:prstGeom>
+        </p:spPr>
+      </p:pic>
+    </p:spTree>
+    <p:extLst>
+      <p:ext uri="{BB962C8B-B14F-4D97-AF65-F5344CB8AC3E}">
+        <p14:creationId xmlns:p14="http://schemas.microsoft.com/office/powerpoint/2010/main" val="4071425377"/>
+      </p:ext>
+    </p:extLst>
+  </p:cSld>
+  <p:clrMapOvr>
+    <a:masterClrMapping/>
+  </p:clrMapOvr>
+  <p:timing>
+    <p:tnLst>
+      <p:par>
+        <p:cTn id="1" dur="indefinite" restart="never" nodeType="tmRoot"/>
+      </p:par>
+    </p:tnLst>
+  </p:timing>
+</p:sld>
+</file>
+
+<file path=ppt/slides/slide17.xml><?xml version="1.0" encoding="utf-8"?>
+<p:sld xmlns:a="http://schemas.openxmlformats.org/drawingml/2006/main" xmlns:r="http://schemas.openxmlformats.org/officeDocument/2006/relationships" xmlns:p="http://schemas.openxmlformats.org/presentationml/2006/main">
+  <p:cSld>
+    <p:spTree>
+      <p:nvGrpSpPr>
+        <p:cNvPr id="1" name=""/>
+        <p:cNvGrpSpPr/>
+        <p:nvPr/>
+      </p:nvGrpSpPr>
+      <p:grpSpPr>
+        <a:xfrm>
+          <a:off x="0" y="0"/>
+          <a:ext cx="0" cy="0"/>
+          <a:chOff x="0" y="0"/>
+          <a:chExt cx="0" cy="0"/>
+        </a:xfrm>
+      </p:grpSpPr>
+      <p:sp>
+        <p:nvSpPr>
+          <p:cNvPr id="2" name="Title 1">
+            <a:extLst>
+              <a:ext uri="{FF2B5EF4-FFF2-40B4-BE49-F238E27FC236}">
+                <a16:creationId xmlns:a16="http://schemas.microsoft.com/office/drawing/2014/main" id="{C4CAAD65-80CD-423F-AC8A-271645B5CDBC}"/>
+              </a:ext>
+            </a:extLst>
+          </p:cNvPr>
+          <p:cNvSpPr>
+            <a:spLocks noGrp="1"/>
+          </p:cNvSpPr>
+          <p:nvPr>
+            <p:ph type="title"/>
+          </p:nvPr>
+        </p:nvSpPr>
+        <p:spPr/>
+        <p:txBody>
+          <a:bodyPr/>
+          <a:lstStyle/>
+          <a:p>
+            <a:r>
+              <a:rPr lang="en-US" dirty="0"/>
+              <a:t>Desktop Application</a:t>
+            </a:r>
+          </a:p>
+        </p:txBody>
+      </p:sp>
+      <p:sp>
+        <p:nvSpPr>
+          <p:cNvPr id="3" name="Content Placeholder 2">
+            <a:extLst>
+              <a:ext uri="{FF2B5EF4-FFF2-40B4-BE49-F238E27FC236}">
+                <a16:creationId xmlns:a16="http://schemas.microsoft.com/office/drawing/2014/main" id="{3FE96D26-E54E-4712-BDCD-19C6AA16E036}"/>
+              </a:ext>
+            </a:extLst>
+          </p:cNvPr>
+          <p:cNvSpPr>
+            <a:spLocks noGrp="1"/>
+          </p:cNvSpPr>
+          <p:nvPr>
+            <p:ph idx="1"/>
+          </p:nvPr>
+        </p:nvSpPr>
+        <p:spPr/>
+        <p:txBody>
+          <a:bodyPr vert="horz" lIns="91440" tIns="45720" rIns="91440" bIns="45720" rtlCol="0" anchor="t">
+            <a:normAutofit/>
+          </a:bodyPr>
+          <a:lstStyle/>
+          <a:p>
+            <a:pPr>
+              <a:buFont typeface="Arial" panose="020B0604020202020204" pitchFamily="34" charset="0"/>
+              <a:buChar char="•"/>
+            </a:pPr>
+            <a:r>
+              <a:rPr lang="en-US" dirty="0" smtClean="0"/>
+              <a:t> Start </a:t>
+            </a:r>
+            <a:r>
+              <a:rPr lang="en-US" dirty="0"/>
+              <a:t>a </a:t>
+            </a:r>
+            <a:r>
+              <a:rPr lang="en-US" dirty="0" smtClean="0"/>
+              <a:t>Journey</a:t>
+            </a:r>
+          </a:p>
+          <a:p>
+            <a:pPr>
+              <a:buFont typeface="Arial" panose="020B0604020202020204" pitchFamily="34" charset="0"/>
+              <a:buChar char="•"/>
+            </a:pPr>
+            <a:r>
+              <a:rPr lang="en-US" dirty="0" smtClean="0"/>
+              <a:t> View Bookings</a:t>
+            </a:r>
+            <a:endParaRPr lang="en-US" dirty="0"/>
+          </a:p>
+        </p:txBody>
+      </p:sp>
+      <p:pic>
+        <p:nvPicPr>
+          <p:cNvPr id="4" name="Picture 3"/>
+          <p:cNvPicPr>
+            <a:picLocks noChangeAspect="1"/>
+          </p:cNvPicPr>
+          <p:nvPr/>
+        </p:nvPicPr>
+        <p:blipFill rotWithShape="1">
+          <a:blip r:embed="rId2"/>
+          <a:srcRect b="4324"/>
+          <a:stretch/>
+        </p:blipFill>
+        <p:spPr>
+          <a:xfrm>
+            <a:off x="3486883" y="1845734"/>
+            <a:ext cx="8186141" cy="4405597"/>
+          </a:xfrm>
+          <a:prstGeom prst="rect">
+            <a:avLst/>
+          </a:prstGeom>
+        </p:spPr>
+      </p:pic>
+    </p:spTree>
+    <p:extLst>
+      <p:ext uri="{BB962C8B-B14F-4D97-AF65-F5344CB8AC3E}">
+        <p14:creationId xmlns:p14="http://schemas.microsoft.com/office/powerpoint/2010/main" val="849776028"/>
+      </p:ext>
+    </p:extLst>
+  </p:cSld>
+  <p:clrMapOvr>
+    <a:masterClrMapping/>
+  </p:clrMapOvr>
+  <p:timing>
+    <p:tnLst>
+      <p:par>
+        <p:cTn id="1" dur="indefinite" restart="never" nodeType="tmRoot"/>
+      </p:par>
+    </p:tnLst>
+  </p:timing>
+</p:sld>
+</file>
+
+<file path=ppt/slides/slide18.xml><?xml version="1.0" encoding="utf-8"?>
+<p:sld xmlns:a="http://schemas.openxmlformats.org/drawingml/2006/main" xmlns:r="http://schemas.openxmlformats.org/officeDocument/2006/relationships" xmlns:p="http://schemas.openxmlformats.org/presentationml/2006/main">
+  <p:cSld>
+    <p:spTree>
+      <p:nvGrpSpPr>
+        <p:cNvPr id="1" name=""/>
+        <p:cNvGrpSpPr/>
+        <p:nvPr/>
+      </p:nvGrpSpPr>
+      <p:grpSpPr>
+        <a:xfrm>
+          <a:off x="0" y="0"/>
+          <a:ext cx="0" cy="0"/>
+          <a:chOff x="0" y="0"/>
+          <a:chExt cx="0" cy="0"/>
+        </a:xfrm>
+      </p:grpSpPr>
+      <p:sp>
+        <p:nvSpPr>
+          <p:cNvPr id="2" name="Title 1">
+            <a:extLst>
+              <a:ext uri="{FF2B5EF4-FFF2-40B4-BE49-F238E27FC236}">
+                <a16:creationId xmlns:a16="http://schemas.microsoft.com/office/drawing/2014/main" id="{F139AA6C-F1C9-4018-8B1C-8837A3B5D5DA}"/>
+              </a:ext>
+            </a:extLst>
+          </p:cNvPr>
+          <p:cNvSpPr>
+            <a:spLocks noGrp="1"/>
+          </p:cNvSpPr>
+          <p:nvPr>
+            <p:ph type="title"/>
+          </p:nvPr>
+        </p:nvSpPr>
+        <p:spPr/>
+        <p:txBody>
+          <a:bodyPr/>
+          <a:lstStyle/>
+          <a:p>
+            <a:r>
+              <a:rPr lang="en-US" dirty="0"/>
+              <a:t>Conclusion</a:t>
+            </a:r>
+          </a:p>
+        </p:txBody>
+      </p:sp>
+      <p:sp>
+        <p:nvSpPr>
+          <p:cNvPr id="3" name="Content Placeholder 2">
+            <a:extLst>
+              <a:ext uri="{FF2B5EF4-FFF2-40B4-BE49-F238E27FC236}">
+                <a16:creationId xmlns:a16="http://schemas.microsoft.com/office/drawing/2014/main" id="{64B73BE8-F55F-4561-BCDB-A6A7781A110E}"/>
+              </a:ext>
+            </a:extLst>
+          </p:cNvPr>
+          <p:cNvSpPr>
+            <a:spLocks noGrp="1"/>
+          </p:cNvSpPr>
+          <p:nvPr>
+            <p:ph idx="1"/>
+          </p:nvPr>
+        </p:nvSpPr>
+        <p:spPr/>
+        <p:txBody>
+          <a:bodyPr vert="horz" lIns="91440" tIns="45720" rIns="91440" bIns="45720" rtlCol="0" anchor="t">
+            <a:normAutofit/>
+          </a:bodyPr>
+          <a:lstStyle/>
+          <a:p>
+            <a:r>
+              <a:rPr lang="en-US" dirty="0"/>
+              <a:t>To conclude:</a:t>
+            </a:r>
+          </a:p>
+          <a:p>
+            <a:pPr lvl="1"/>
+            <a:r>
+              <a:rPr lang="en-US" dirty="0"/>
+              <a:t>Attempts have been made to create full CRUD functionality when and where possible.</a:t>
+            </a:r>
+          </a:p>
+          <a:p>
+            <a:pPr lvl="1"/>
+            <a:r>
+              <a:rPr lang="en-US" dirty="0"/>
+              <a:t>HCI has been used in order to benefit the experience of the end user (e.g. large buttons on desktop app for touch screen use, simplistic UI for Android app, easily </a:t>
+            </a:r>
+            <a:r>
+              <a:rPr lang="en-US" dirty="0" err="1"/>
+              <a:t>navigatable</a:t>
+            </a:r>
+            <a:r>
+              <a:rPr lang="en-US" dirty="0"/>
+              <a:t> web app).</a:t>
+            </a:r>
+          </a:p>
+          <a:p>
+            <a:pPr lvl="1"/>
+            <a:endParaRPr lang="en-US" dirty="0"/>
+          </a:p>
+        </p:txBody>
+      </p:sp>
+    </p:spTree>
+    <p:extLst>
+      <p:ext uri="{BB962C8B-B14F-4D97-AF65-F5344CB8AC3E}">
+        <p14:creationId xmlns:p14="http://schemas.microsoft.com/office/powerpoint/2010/main" val="3920226305"/>
+      </p:ext>
+    </p:extLst>
+  </p:cSld>
+  <p:clrMapOvr>
+    <a:masterClrMapping/>
+  </p:clrMapOvr>
+  <p:timing>
+    <p:tnLst>
+      <p:par>
+        <p:cTn id="1" dur="indefinite" restart="never" nodeType="tmRoot"/>
+      </p:par>
+    </p:tnLst>
+  </p:timing>
 </p:sld>
 </file>
 
@@ -6090,700 +6306,13 @@
   <p:clrMapOvr>
     <a:masterClrMapping/>
   </p:clrMapOvr>
-</p:sld>
-</file>
-
-<file path=ppt/slides/slide20.xml><?xml version="1.0" encoding="utf-8"?>
-<p:sld xmlns:a="http://schemas.openxmlformats.org/drawingml/2006/main" xmlns:r="http://schemas.openxmlformats.org/officeDocument/2006/relationships" xmlns:p="http://schemas.openxmlformats.org/presentationml/2006/main">
-  <p:cSld>
-    <p:spTree>
-      <p:nvGrpSpPr>
-        <p:cNvPr id="1" name=""/>
-        <p:cNvGrpSpPr/>
-        <p:nvPr/>
-      </p:nvGrpSpPr>
-      <p:grpSpPr>
-        <a:xfrm>
-          <a:off x="0" y="0"/>
-          <a:ext cx="0" cy="0"/>
-          <a:chOff x="0" y="0"/>
-          <a:chExt cx="0" cy="0"/>
-        </a:xfrm>
-      </p:grpSpPr>
-      <p:sp>
-        <p:nvSpPr>
-          <p:cNvPr id="2" name="Title 1">
-            <a:extLst>
-              <a:ext uri="{FF2B5EF4-FFF2-40B4-BE49-F238E27FC236}">
-                <a16:creationId xmlns:a16="http://schemas.microsoft.com/office/drawing/2014/main" id="{BE901AD9-752E-480C-922A-BA00B2629972}"/>
-              </a:ext>
-            </a:extLst>
-          </p:cNvPr>
-          <p:cNvSpPr>
-            <a:spLocks noGrp="1"/>
-          </p:cNvSpPr>
-          <p:nvPr>
-            <p:ph type="title"/>
-          </p:nvPr>
-        </p:nvSpPr>
-        <p:spPr/>
-        <p:txBody>
-          <a:bodyPr/>
-          <a:lstStyle/>
-          <a:p>
-            <a:r>
-              <a:rPr lang="en-US" dirty="0"/>
-              <a:t>Desktop Application</a:t>
-            </a:r>
-          </a:p>
-        </p:txBody>
-      </p:sp>
-      <p:sp>
-        <p:nvSpPr>
-          <p:cNvPr id="3" name="Content Placeholder 2">
-            <a:extLst>
-              <a:ext uri="{FF2B5EF4-FFF2-40B4-BE49-F238E27FC236}">
-                <a16:creationId xmlns:a16="http://schemas.microsoft.com/office/drawing/2014/main" id="{6EB65DE5-FECB-4974-BD6B-58410BCEA553}"/>
-              </a:ext>
-            </a:extLst>
-          </p:cNvPr>
-          <p:cNvSpPr>
-            <a:spLocks noGrp="1"/>
-          </p:cNvSpPr>
-          <p:nvPr>
-            <p:ph idx="1"/>
-          </p:nvPr>
-        </p:nvSpPr>
-        <p:spPr/>
-        <p:txBody>
-          <a:bodyPr vert="horz" lIns="91440" tIns="45720" rIns="91440" bIns="45720" rtlCol="0" anchor="t">
-            <a:normAutofit/>
-          </a:bodyPr>
-          <a:lstStyle/>
-          <a:p>
-            <a:r>
-              <a:rPr lang="en-US"/>
-              <a:t>Logging in:</a:t>
-            </a:r>
-          </a:p>
-        </p:txBody>
-      </p:sp>
-      <p:pic>
-        <p:nvPicPr>
-          <p:cNvPr id="6" name="Picture 6" descr="A screenshot of a cell phone&#10;&#10;Description generated with very high confidence">
-            <a:extLst>
-              <a:ext uri="{FF2B5EF4-FFF2-40B4-BE49-F238E27FC236}">
-                <a16:creationId xmlns:a16="http://schemas.microsoft.com/office/drawing/2014/main" id="{31291D5F-7328-423C-942D-2CD92015CA26}"/>
-              </a:ext>
-            </a:extLst>
-          </p:cNvPr>
-          <p:cNvPicPr>
-            <a:picLocks noChangeAspect="1"/>
-          </p:cNvPicPr>
-          <p:nvPr/>
-        </p:nvPicPr>
-        <p:blipFill>
-          <a:blip r:embed="rId2"/>
-          <a:stretch>
-            <a:fillRect/>
-          </a:stretch>
-        </p:blipFill>
-        <p:spPr>
-          <a:xfrm>
-            <a:off x="3432717" y="1877587"/>
-            <a:ext cx="7677612" cy="4143606"/>
-          </a:xfrm>
-          <a:prstGeom prst="rect">
-            <a:avLst/>
-          </a:prstGeom>
-        </p:spPr>
-      </p:pic>
-    </p:spTree>
-    <p:extLst>
-      <p:ext uri="{BB962C8B-B14F-4D97-AF65-F5344CB8AC3E}">
-        <p14:creationId xmlns:p14="http://schemas.microsoft.com/office/powerpoint/2010/main" val="3447251603"/>
-      </p:ext>
-    </p:extLst>
-  </p:cSld>
-  <p:clrMapOvr>
-    <a:masterClrMapping/>
-  </p:clrMapOvr>
-</p:sld>
-</file>
-
-<file path=ppt/slides/slide21.xml><?xml version="1.0" encoding="utf-8"?>
-<p:sld xmlns:a="http://schemas.openxmlformats.org/drawingml/2006/main" xmlns:r="http://schemas.openxmlformats.org/officeDocument/2006/relationships" xmlns:p="http://schemas.openxmlformats.org/presentationml/2006/main">
-  <p:cSld>
-    <p:spTree>
-      <p:nvGrpSpPr>
-        <p:cNvPr id="1" name=""/>
-        <p:cNvGrpSpPr/>
-        <p:nvPr/>
-      </p:nvGrpSpPr>
-      <p:grpSpPr>
-        <a:xfrm>
-          <a:off x="0" y="0"/>
-          <a:ext cx="0" cy="0"/>
-          <a:chOff x="0" y="0"/>
-          <a:chExt cx="0" cy="0"/>
-        </a:xfrm>
-      </p:grpSpPr>
-      <p:sp>
-        <p:nvSpPr>
-          <p:cNvPr id="2" name="Title 1">
-            <a:extLst>
-              <a:ext uri="{FF2B5EF4-FFF2-40B4-BE49-F238E27FC236}">
-                <a16:creationId xmlns:a16="http://schemas.microsoft.com/office/drawing/2014/main" id="{181FCE6F-3A44-4C61-8008-82A517D0FE3E}"/>
-              </a:ext>
-            </a:extLst>
-          </p:cNvPr>
-          <p:cNvSpPr>
-            <a:spLocks noGrp="1"/>
-          </p:cNvSpPr>
-          <p:nvPr>
-            <p:ph type="title"/>
-          </p:nvPr>
-        </p:nvSpPr>
-        <p:spPr/>
-        <p:txBody>
-          <a:bodyPr/>
-          <a:lstStyle/>
-          <a:p>
-            <a:r>
-              <a:rPr lang="en-US" dirty="0"/>
-              <a:t>Desktop Application</a:t>
-            </a:r>
-          </a:p>
-        </p:txBody>
-      </p:sp>
-      <p:sp>
-        <p:nvSpPr>
-          <p:cNvPr id="3" name="Content Placeholder 2">
-            <a:extLst>
-              <a:ext uri="{FF2B5EF4-FFF2-40B4-BE49-F238E27FC236}">
-                <a16:creationId xmlns:a16="http://schemas.microsoft.com/office/drawing/2014/main" id="{D98B83F6-8DDD-438B-B944-99EBA9134F5A}"/>
-              </a:ext>
-            </a:extLst>
-          </p:cNvPr>
-          <p:cNvSpPr>
-            <a:spLocks noGrp="1"/>
-          </p:cNvSpPr>
-          <p:nvPr>
-            <p:ph idx="1"/>
-          </p:nvPr>
-        </p:nvSpPr>
-        <p:spPr/>
-        <p:txBody>
-          <a:bodyPr vert="horz" lIns="91440" tIns="45720" rIns="91440" bIns="45720" rtlCol="0" anchor="t">
-            <a:normAutofit/>
-          </a:bodyPr>
-          <a:lstStyle/>
-          <a:p>
-            <a:r>
-              <a:rPr lang="en-US"/>
-              <a:t>Selecting a shift:</a:t>
-            </a:r>
-          </a:p>
-        </p:txBody>
-      </p:sp>
-      <p:pic>
-        <p:nvPicPr>
-          <p:cNvPr id="4" name="Picture 4" descr="A screenshot of a cell phone&#10;&#10;Description generated with very high confidence">
-            <a:extLst>
-              <a:ext uri="{FF2B5EF4-FFF2-40B4-BE49-F238E27FC236}">
-                <a16:creationId xmlns:a16="http://schemas.microsoft.com/office/drawing/2014/main" id="{D4D81E0C-8014-43A4-9836-5941EC9DC7D9}"/>
-              </a:ext>
-            </a:extLst>
-          </p:cNvPr>
-          <p:cNvPicPr>
-            <a:picLocks noChangeAspect="1"/>
-          </p:cNvPicPr>
-          <p:nvPr/>
-        </p:nvPicPr>
-        <p:blipFill>
-          <a:blip r:embed="rId2"/>
-          <a:stretch>
-            <a:fillRect/>
-          </a:stretch>
-        </p:blipFill>
-        <p:spPr>
-          <a:xfrm>
-            <a:off x="3339791" y="1849011"/>
-            <a:ext cx="7854174" cy="4405195"/>
-          </a:xfrm>
-          <a:prstGeom prst="rect">
-            <a:avLst/>
-          </a:prstGeom>
-        </p:spPr>
-      </p:pic>
-    </p:spTree>
-    <p:extLst>
-      <p:ext uri="{BB962C8B-B14F-4D97-AF65-F5344CB8AC3E}">
-        <p14:creationId xmlns:p14="http://schemas.microsoft.com/office/powerpoint/2010/main" val="2289745724"/>
-      </p:ext>
-    </p:extLst>
-  </p:cSld>
-  <p:clrMapOvr>
-    <a:masterClrMapping/>
-  </p:clrMapOvr>
-</p:sld>
-</file>
-
-<file path=ppt/slides/slide22.xml><?xml version="1.0" encoding="utf-8"?>
-<p:sld xmlns:a="http://schemas.openxmlformats.org/drawingml/2006/main" xmlns:r="http://schemas.openxmlformats.org/officeDocument/2006/relationships" xmlns:p="http://schemas.openxmlformats.org/presentationml/2006/main">
-  <p:cSld>
-    <p:spTree>
-      <p:nvGrpSpPr>
-        <p:cNvPr id="1" name=""/>
-        <p:cNvGrpSpPr/>
-        <p:nvPr/>
-      </p:nvGrpSpPr>
-      <p:grpSpPr>
-        <a:xfrm>
-          <a:off x="0" y="0"/>
-          <a:ext cx="0" cy="0"/>
-          <a:chOff x="0" y="0"/>
-          <a:chExt cx="0" cy="0"/>
-        </a:xfrm>
-      </p:grpSpPr>
-      <p:sp>
-        <p:nvSpPr>
-          <p:cNvPr id="2" name="Title 1">
-            <a:extLst>
-              <a:ext uri="{FF2B5EF4-FFF2-40B4-BE49-F238E27FC236}">
-                <a16:creationId xmlns:a16="http://schemas.microsoft.com/office/drawing/2014/main" id="{42738043-2024-458B-971D-C4B33D773D7F}"/>
-              </a:ext>
-            </a:extLst>
-          </p:cNvPr>
-          <p:cNvSpPr>
-            <a:spLocks noGrp="1"/>
-          </p:cNvSpPr>
-          <p:nvPr>
-            <p:ph type="title"/>
-          </p:nvPr>
-        </p:nvSpPr>
-        <p:spPr/>
-        <p:txBody>
-          <a:bodyPr/>
-          <a:lstStyle/>
-          <a:p>
-            <a:r>
-              <a:rPr lang="en-US" dirty="0"/>
-              <a:t>Desktop Application</a:t>
-            </a:r>
-          </a:p>
-        </p:txBody>
-      </p:sp>
-      <p:sp>
-        <p:nvSpPr>
-          <p:cNvPr id="3" name="Content Placeholder 2">
-            <a:extLst>
-              <a:ext uri="{FF2B5EF4-FFF2-40B4-BE49-F238E27FC236}">
-                <a16:creationId xmlns:a16="http://schemas.microsoft.com/office/drawing/2014/main" id="{105EE1EB-AC26-4CB8-AB02-DD3561CB2E95}"/>
-              </a:ext>
-            </a:extLst>
-          </p:cNvPr>
-          <p:cNvSpPr>
-            <a:spLocks noGrp="1"/>
-          </p:cNvSpPr>
-          <p:nvPr>
-            <p:ph idx="1"/>
-          </p:nvPr>
-        </p:nvSpPr>
-        <p:spPr/>
-        <p:txBody>
-          <a:bodyPr vert="horz" lIns="91440" tIns="45720" rIns="91440" bIns="45720" rtlCol="0" anchor="t">
-            <a:normAutofit/>
-          </a:bodyPr>
-          <a:lstStyle/>
-          <a:p>
-            <a:r>
-              <a:rPr lang="en-US"/>
-              <a:t>Starting a journey:</a:t>
-            </a:r>
-          </a:p>
-        </p:txBody>
-      </p:sp>
-    </p:spTree>
-    <p:extLst>
-      <p:ext uri="{BB962C8B-B14F-4D97-AF65-F5344CB8AC3E}">
-        <p14:creationId xmlns:p14="http://schemas.microsoft.com/office/powerpoint/2010/main" val="4071425377"/>
-      </p:ext>
-    </p:extLst>
-  </p:cSld>
-  <p:clrMapOvr>
-    <a:masterClrMapping/>
-  </p:clrMapOvr>
-</p:sld>
-</file>
-
-<file path=ppt/slides/slide23.xml><?xml version="1.0" encoding="utf-8"?>
-<p:sld xmlns:a="http://schemas.openxmlformats.org/drawingml/2006/main" xmlns:r="http://schemas.openxmlformats.org/officeDocument/2006/relationships" xmlns:p="http://schemas.openxmlformats.org/presentationml/2006/main">
-  <p:cSld>
-    <p:spTree>
-      <p:nvGrpSpPr>
-        <p:cNvPr id="1" name=""/>
-        <p:cNvGrpSpPr/>
-        <p:nvPr/>
-      </p:nvGrpSpPr>
-      <p:grpSpPr>
-        <a:xfrm>
-          <a:off x="0" y="0"/>
-          <a:ext cx="0" cy="0"/>
-          <a:chOff x="0" y="0"/>
-          <a:chExt cx="0" cy="0"/>
-        </a:xfrm>
-      </p:grpSpPr>
-      <p:sp>
-        <p:nvSpPr>
-          <p:cNvPr id="2" name="Title 1">
-            <a:extLst>
-              <a:ext uri="{FF2B5EF4-FFF2-40B4-BE49-F238E27FC236}">
-                <a16:creationId xmlns:a16="http://schemas.microsoft.com/office/drawing/2014/main" id="{C4CAAD65-80CD-423F-AC8A-271645B5CDBC}"/>
-              </a:ext>
-            </a:extLst>
-          </p:cNvPr>
-          <p:cNvSpPr>
-            <a:spLocks noGrp="1"/>
-          </p:cNvSpPr>
-          <p:nvPr>
-            <p:ph type="title"/>
-          </p:nvPr>
-        </p:nvSpPr>
-        <p:spPr/>
-        <p:txBody>
-          <a:bodyPr/>
-          <a:lstStyle/>
-          <a:p>
-            <a:r>
-              <a:rPr lang="en-US" dirty="0"/>
-              <a:t>Desktop Application</a:t>
-            </a:r>
-          </a:p>
-        </p:txBody>
-      </p:sp>
-      <p:sp>
-        <p:nvSpPr>
-          <p:cNvPr id="3" name="Content Placeholder 2">
-            <a:extLst>
-              <a:ext uri="{FF2B5EF4-FFF2-40B4-BE49-F238E27FC236}">
-                <a16:creationId xmlns:a16="http://schemas.microsoft.com/office/drawing/2014/main" id="{3FE96D26-E54E-4712-BDCD-19C6AA16E036}"/>
-              </a:ext>
-            </a:extLst>
-          </p:cNvPr>
-          <p:cNvSpPr>
-            <a:spLocks noGrp="1"/>
-          </p:cNvSpPr>
-          <p:nvPr>
-            <p:ph idx="1"/>
-          </p:nvPr>
-        </p:nvSpPr>
-        <p:spPr/>
-        <p:txBody>
-          <a:bodyPr vert="horz" lIns="91440" tIns="45720" rIns="91440" bIns="45720" rtlCol="0" anchor="t">
-            <a:normAutofit/>
-          </a:bodyPr>
-          <a:lstStyle/>
-          <a:p>
-            <a:r>
-              <a:rPr lang="en-US"/>
-              <a:t>Go to stops:</a:t>
-            </a:r>
-          </a:p>
-        </p:txBody>
-      </p:sp>
-    </p:spTree>
-    <p:extLst>
-      <p:ext uri="{BB962C8B-B14F-4D97-AF65-F5344CB8AC3E}">
-        <p14:creationId xmlns:p14="http://schemas.microsoft.com/office/powerpoint/2010/main" val="849776028"/>
-      </p:ext>
-    </p:extLst>
-  </p:cSld>
-  <p:clrMapOvr>
-    <a:masterClrMapping/>
-  </p:clrMapOvr>
-</p:sld>
-</file>
-
-<file path=ppt/slides/slide24.xml><?xml version="1.0" encoding="utf-8"?>
-<p:sld xmlns:a="http://schemas.openxmlformats.org/drawingml/2006/main" xmlns:r="http://schemas.openxmlformats.org/officeDocument/2006/relationships" xmlns:p="http://schemas.openxmlformats.org/presentationml/2006/main">
-  <p:cSld>
-    <p:spTree>
-      <p:nvGrpSpPr>
-        <p:cNvPr id="1" name=""/>
-        <p:cNvGrpSpPr/>
-        <p:nvPr/>
-      </p:nvGrpSpPr>
-      <p:grpSpPr>
-        <a:xfrm>
-          <a:off x="0" y="0"/>
-          <a:ext cx="0" cy="0"/>
-          <a:chOff x="0" y="0"/>
-          <a:chExt cx="0" cy="0"/>
-        </a:xfrm>
-      </p:grpSpPr>
-      <p:sp>
-        <p:nvSpPr>
-          <p:cNvPr id="2" name="Title 1">
-            <a:extLst>
-              <a:ext uri="{FF2B5EF4-FFF2-40B4-BE49-F238E27FC236}">
-                <a16:creationId xmlns:a16="http://schemas.microsoft.com/office/drawing/2014/main" id="{91EDA493-DF72-4296-9EC0-E27A4584F21D}"/>
-              </a:ext>
-            </a:extLst>
-          </p:cNvPr>
-          <p:cNvSpPr>
-            <a:spLocks noGrp="1"/>
-          </p:cNvSpPr>
-          <p:nvPr>
-            <p:ph type="title"/>
-          </p:nvPr>
-        </p:nvSpPr>
-        <p:spPr/>
-        <p:txBody>
-          <a:bodyPr/>
-          <a:lstStyle/>
-          <a:p>
-            <a:r>
-              <a:rPr lang="en-US" dirty="0"/>
-              <a:t>Desktop Application</a:t>
-            </a:r>
-          </a:p>
-        </p:txBody>
-      </p:sp>
-      <p:sp>
-        <p:nvSpPr>
-          <p:cNvPr id="3" name="Content Placeholder 2">
-            <a:extLst>
-              <a:ext uri="{FF2B5EF4-FFF2-40B4-BE49-F238E27FC236}">
-                <a16:creationId xmlns:a16="http://schemas.microsoft.com/office/drawing/2014/main" id="{42BBADC0-ECF1-44CB-B33B-3D55C3A14CDF}"/>
-              </a:ext>
-            </a:extLst>
-          </p:cNvPr>
-          <p:cNvSpPr>
-            <a:spLocks noGrp="1"/>
-          </p:cNvSpPr>
-          <p:nvPr>
-            <p:ph idx="1"/>
-          </p:nvPr>
-        </p:nvSpPr>
-        <p:spPr/>
-        <p:txBody>
-          <a:bodyPr vert="horz" lIns="91440" tIns="45720" rIns="91440" bIns="45720" rtlCol="0" anchor="t">
-            <a:normAutofit/>
-          </a:bodyPr>
-          <a:lstStyle/>
-          <a:p>
-            <a:r>
-              <a:rPr lang="en-US"/>
-              <a:t>Accept bookings:</a:t>
-            </a:r>
-          </a:p>
-        </p:txBody>
-      </p:sp>
-    </p:spTree>
-    <p:extLst>
-      <p:ext uri="{BB962C8B-B14F-4D97-AF65-F5344CB8AC3E}">
-        <p14:creationId xmlns:p14="http://schemas.microsoft.com/office/powerpoint/2010/main" val="210209093"/>
-      </p:ext>
-    </p:extLst>
-  </p:cSld>
-  <p:clrMapOvr>
-    <a:masterClrMapping/>
-  </p:clrMapOvr>
-</p:sld>
-</file>
-
-<file path=ppt/slides/slide25.xml><?xml version="1.0" encoding="utf-8"?>
-<p:sld xmlns:a="http://schemas.openxmlformats.org/drawingml/2006/main" xmlns:r="http://schemas.openxmlformats.org/officeDocument/2006/relationships" xmlns:p="http://schemas.openxmlformats.org/presentationml/2006/main">
-  <p:cSld>
-    <p:spTree>
-      <p:nvGrpSpPr>
-        <p:cNvPr id="1" name=""/>
-        <p:cNvGrpSpPr/>
-        <p:nvPr/>
-      </p:nvGrpSpPr>
-      <p:grpSpPr>
-        <a:xfrm>
-          <a:off x="0" y="0"/>
-          <a:ext cx="0" cy="0"/>
-          <a:chOff x="0" y="0"/>
-          <a:chExt cx="0" cy="0"/>
-        </a:xfrm>
-      </p:grpSpPr>
-      <p:sp>
-        <p:nvSpPr>
-          <p:cNvPr id="2" name="Title 1">
-            <a:extLst>
-              <a:ext uri="{FF2B5EF4-FFF2-40B4-BE49-F238E27FC236}">
-                <a16:creationId xmlns:a16="http://schemas.microsoft.com/office/drawing/2014/main" id="{37532475-C50A-4CE0-BEE3-C4590D3496B0}"/>
-              </a:ext>
-            </a:extLst>
-          </p:cNvPr>
-          <p:cNvSpPr>
-            <a:spLocks noGrp="1"/>
-          </p:cNvSpPr>
-          <p:nvPr>
-            <p:ph type="title"/>
-          </p:nvPr>
-        </p:nvSpPr>
-        <p:spPr/>
-        <p:txBody>
-          <a:bodyPr/>
-          <a:lstStyle/>
-          <a:p>
-            <a:r>
-              <a:rPr lang="en-US" dirty="0"/>
-              <a:t>Desktop Application</a:t>
-            </a:r>
-          </a:p>
-        </p:txBody>
-      </p:sp>
-      <p:sp>
-        <p:nvSpPr>
-          <p:cNvPr id="3" name="Content Placeholder 2">
-            <a:extLst>
-              <a:ext uri="{FF2B5EF4-FFF2-40B4-BE49-F238E27FC236}">
-                <a16:creationId xmlns:a16="http://schemas.microsoft.com/office/drawing/2014/main" id="{AD70F190-A9A5-4DD0-A303-6207717FCD58}"/>
-              </a:ext>
-            </a:extLst>
-          </p:cNvPr>
-          <p:cNvSpPr>
-            <a:spLocks noGrp="1"/>
-          </p:cNvSpPr>
-          <p:nvPr>
-            <p:ph idx="1"/>
-          </p:nvPr>
-        </p:nvSpPr>
-        <p:spPr/>
-        <p:txBody>
-          <a:bodyPr vert="horz" lIns="91440" tIns="45720" rIns="91440" bIns="45720" rtlCol="0" anchor="t">
-            <a:normAutofit/>
-          </a:bodyPr>
-          <a:lstStyle/>
-          <a:p>
-            <a:r>
-              <a:rPr lang="en-US"/>
-              <a:t>Ending a journey:</a:t>
-            </a:r>
-          </a:p>
-        </p:txBody>
-      </p:sp>
-    </p:spTree>
-    <p:extLst>
-      <p:ext uri="{BB962C8B-B14F-4D97-AF65-F5344CB8AC3E}">
-        <p14:creationId xmlns:p14="http://schemas.microsoft.com/office/powerpoint/2010/main" val="3623971178"/>
-      </p:ext>
-    </p:extLst>
-  </p:cSld>
-  <p:clrMapOvr>
-    <a:masterClrMapping/>
-  </p:clrMapOvr>
-</p:sld>
-</file>
-
-<file path=ppt/slides/slide26.xml><?xml version="1.0" encoding="utf-8"?>
-<p:sld xmlns:a="http://schemas.openxmlformats.org/drawingml/2006/main" xmlns:r="http://schemas.openxmlformats.org/officeDocument/2006/relationships" xmlns:p="http://schemas.openxmlformats.org/presentationml/2006/main">
-  <p:cSld>
-    <p:spTree>
-      <p:nvGrpSpPr>
-        <p:cNvPr id="1" name=""/>
-        <p:cNvGrpSpPr/>
-        <p:nvPr/>
-      </p:nvGrpSpPr>
-      <p:grpSpPr>
-        <a:xfrm>
-          <a:off x="0" y="0"/>
-          <a:ext cx="0" cy="0"/>
-          <a:chOff x="0" y="0"/>
-          <a:chExt cx="0" cy="0"/>
-        </a:xfrm>
-      </p:grpSpPr>
-      <p:sp>
-        <p:nvSpPr>
-          <p:cNvPr id="2" name="Title 1">
-            <a:extLst>
-              <a:ext uri="{FF2B5EF4-FFF2-40B4-BE49-F238E27FC236}">
-                <a16:creationId xmlns:a16="http://schemas.microsoft.com/office/drawing/2014/main" id="{F139AA6C-F1C9-4018-8B1C-8837A3B5D5DA}"/>
-              </a:ext>
-            </a:extLst>
-          </p:cNvPr>
-          <p:cNvSpPr>
-            <a:spLocks noGrp="1"/>
-          </p:cNvSpPr>
-          <p:nvPr>
-            <p:ph type="title"/>
-          </p:nvPr>
-        </p:nvSpPr>
-        <p:spPr/>
-        <p:txBody>
-          <a:bodyPr/>
-          <a:lstStyle/>
-          <a:p>
-            <a:r>
-              <a:rPr lang="en-US" dirty="0"/>
-              <a:t>Conclusion</a:t>
-            </a:r>
-          </a:p>
-        </p:txBody>
-      </p:sp>
-      <p:sp>
-        <p:nvSpPr>
-          <p:cNvPr id="3" name="Content Placeholder 2">
-            <a:extLst>
-              <a:ext uri="{FF2B5EF4-FFF2-40B4-BE49-F238E27FC236}">
-                <a16:creationId xmlns:a16="http://schemas.microsoft.com/office/drawing/2014/main" id="{64B73BE8-F55F-4561-BCDB-A6A7781A110E}"/>
-              </a:ext>
-            </a:extLst>
-          </p:cNvPr>
-          <p:cNvSpPr>
-            <a:spLocks noGrp="1"/>
-          </p:cNvSpPr>
-          <p:nvPr>
-            <p:ph idx="1"/>
-          </p:nvPr>
-        </p:nvSpPr>
-        <p:spPr/>
-        <p:txBody>
-          <a:bodyPr vert="horz" lIns="91440" tIns="45720" rIns="91440" bIns="45720" rtlCol="0" anchor="t">
-            <a:normAutofit/>
-          </a:bodyPr>
-          <a:lstStyle/>
-          <a:p>
-            <a:r>
-              <a:rPr lang="en-US"/>
-              <a:t>To conclude:</a:t>
-            </a:r>
-          </a:p>
-          <a:p>
-            <a:pPr lvl="1"/>
-            <a:r>
-              <a:rPr lang="en-US"/>
-              <a:t>Attempts have been made to create full CRUD functionality when and where possible.</a:t>
-            </a:r>
-          </a:p>
-          <a:p>
-            <a:pPr lvl="1"/>
-            <a:r>
-              <a:rPr lang="en-US"/>
-              <a:t>HCI has been used in order to benefit the experience of the end user (e.g. large buttons on desktop app for touch screen use, simplistic UI for Android app, easily navigatable web app).</a:t>
-            </a:r>
-          </a:p>
-          <a:p>
-            <a:pPr lvl="1"/>
-            <a:endParaRPr lang="en-US"/>
-          </a:p>
-        </p:txBody>
-      </p:sp>
-    </p:spTree>
-    <p:extLst>
-      <p:ext uri="{BB962C8B-B14F-4D97-AF65-F5344CB8AC3E}">
-        <p14:creationId xmlns:p14="http://schemas.microsoft.com/office/powerpoint/2010/main" val="3920226305"/>
-      </p:ext>
-    </p:extLst>
-  </p:cSld>
-  <p:clrMapOvr>
-    <a:masterClrMapping/>
-  </p:clrMapOvr>
+  <p:timing>
+    <p:tnLst>
+      <p:par>
+        <p:cTn id="1" dur="indefinite" restart="never" nodeType="tmRoot"/>
+      </p:par>
+    </p:tnLst>
+  </p:timing>
 </p:sld>
 </file>
 
@@ -6857,74 +6386,65 @@
           <a:p>
             <a:r>
               <a:rPr lang="en-US" dirty="0"/>
-              <a:t>The user stories that will be demonstrated for the mobile app are:</a:t>
-            </a:r>
+              <a:t>The user stories that will be demonstrated for the mobile app are</a:t>
+            </a:r>
+            <a:r>
+              <a:rPr lang="en-US" dirty="0" smtClean="0"/>
+              <a:t>:</a:t>
+            </a:r>
+            <a:endParaRPr lang="en-US" dirty="0" smtClean="0">
+              <a:cs typeface="Calibri"/>
+            </a:endParaRPr>
           </a:p>
           <a:p>
             <a:pPr marL="383540" lvl="1"/>
+            <a:r>
+              <a:rPr lang="en-US" dirty="0" smtClean="0">
+                <a:cs typeface="Calibri"/>
+              </a:rPr>
+              <a:t>Create </a:t>
+            </a:r>
             <a:r>
               <a:rPr lang="en-US" dirty="0">
                 <a:cs typeface="Calibri"/>
               </a:rPr>
-              <a:t>Create an account</a:t>
+              <a:t>an account</a:t>
             </a:r>
             <a:endParaRPr lang="en-US" dirty="0"/>
           </a:p>
           <a:p>
             <a:pPr marL="383540" lvl="1"/>
             <a:r>
-              <a:rPr lang="en-US" dirty="0"/>
-              <a:t>Logging in</a:t>
+              <a:rPr lang="en-US" dirty="0" smtClean="0"/>
+              <a:t>Login</a:t>
+            </a:r>
+          </a:p>
+          <a:p>
+            <a:pPr marL="383540" lvl="1"/>
+            <a:r>
+              <a:rPr lang="en-US" dirty="0" smtClean="0"/>
+              <a:t>View </a:t>
+            </a:r>
+            <a:r>
+              <a:rPr lang="en-US" dirty="0"/>
+              <a:t>account </a:t>
+            </a:r>
+            <a:r>
+              <a:rPr lang="en-US" dirty="0" smtClean="0"/>
+              <a:t>details</a:t>
+            </a:r>
+          </a:p>
+          <a:p>
+            <a:pPr marL="383540" lvl="1"/>
+            <a:r>
+              <a:rPr lang="en-US" dirty="0" smtClean="0">
+                <a:cs typeface="Calibri"/>
+              </a:rPr>
+              <a:t>Search for a journey</a:t>
             </a:r>
             <a:endParaRPr lang="en-US" dirty="0">
               <a:cs typeface="Calibri"/>
             </a:endParaRPr>
-          </a:p>
-          <a:p>
-            <a:pPr marL="383540" lvl="1"/>
-            <a:r>
-              <a:rPr lang="en-US" dirty="0"/>
-              <a:t>Searching for a journey</a:t>
-            </a:r>
-            <a:endParaRPr lang="en-US" dirty="0">
-              <a:cs typeface="Calibri"/>
-            </a:endParaRPr>
-          </a:p>
-          <a:p>
-            <a:pPr marL="383540" lvl="1"/>
-            <a:r>
-              <a:rPr lang="en-US" dirty="0"/>
-              <a:t>Booking a ticket</a:t>
-            </a:r>
-            <a:endParaRPr lang="en-US" dirty="0">
-              <a:cs typeface="Calibri"/>
-            </a:endParaRPr>
-          </a:p>
-          <a:p>
-            <a:pPr marL="383540" lvl="1"/>
-            <a:r>
-              <a:rPr lang="en-US" dirty="0"/>
-              <a:t>Viewing bookings</a:t>
-            </a:r>
-            <a:endParaRPr lang="en-US" dirty="0">
-              <a:cs typeface="Calibri"/>
-            </a:endParaRPr>
-          </a:p>
-          <a:p>
-            <a:pPr marL="383540" lvl="1"/>
-            <a:r>
-              <a:rPr lang="en-US" dirty="0"/>
-              <a:t>Viewing account details</a:t>
-            </a:r>
-            <a:endParaRPr lang="en-US" dirty="0">
-              <a:cs typeface="Calibri"/>
-            </a:endParaRPr>
-          </a:p>
-          <a:p>
-            <a:pPr marL="457200" lvl="1" indent="0">
-              <a:buNone/>
-            </a:pPr>
-            <a:endParaRPr lang="en-US"/>
           </a:p>
         </p:txBody>
       </p:sp>
@@ -6938,6 +6458,13 @@
   <p:clrMapOvr>
     <a:masterClrMapping/>
   </p:clrMapOvr>
+  <p:timing>
+    <p:tnLst>
+      <p:par>
+        <p:cTn id="1" dur="indefinite" restart="never" nodeType="tmRoot"/>
+      </p:par>
+    </p:tnLst>
+  </p:timing>
 </p:sld>
 </file>
 
@@ -7017,8 +6544,19 @@
           <a:p>
             <a:pPr marL="383540" lvl="1"/>
             <a:r>
-              <a:rPr lang="en-US" dirty="0"/>
-              <a:t>Logging in to the system</a:t>
+              <a:rPr lang="en-US" dirty="0" smtClean="0"/>
+              <a:t>Login</a:t>
+            </a:r>
+          </a:p>
+          <a:p>
+            <a:pPr marL="383540" lvl="1"/>
+            <a:r>
+              <a:rPr lang="en-US" dirty="0" smtClean="0"/>
+              <a:t>View all </a:t>
+            </a:r>
+            <a:r>
+              <a:rPr lang="en-US" dirty="0"/>
+              <a:t>coaches</a:t>
             </a:r>
             <a:endParaRPr lang="en-US" dirty="0">
               <a:cs typeface="Calibri"/>
@@ -7027,8 +6565,12 @@
           <a:p>
             <a:pPr marL="383540" lvl="1"/>
             <a:r>
-              <a:rPr lang="en-US" dirty="0"/>
-              <a:t>Viewing current coaches</a:t>
+              <a:rPr lang="en-US" dirty="0" smtClean="0"/>
+              <a:t>Create </a:t>
+            </a:r>
+            <a:r>
+              <a:rPr lang="en-US" dirty="0"/>
+              <a:t>a new coach record</a:t>
             </a:r>
             <a:endParaRPr lang="en-US" dirty="0">
               <a:cs typeface="Calibri"/>
@@ -7037,8 +6579,12 @@
           <a:p>
             <a:pPr marL="383540" lvl="1"/>
             <a:r>
-              <a:rPr lang="en-US" dirty="0"/>
-              <a:t>Creating a new coach record</a:t>
+              <a:rPr lang="en-US" dirty="0" smtClean="0"/>
+              <a:t>Edit coach </a:t>
+            </a:r>
+            <a:r>
+              <a:rPr lang="en-US" dirty="0"/>
+              <a:t>capacity</a:t>
             </a:r>
             <a:endParaRPr lang="en-US" dirty="0">
               <a:cs typeface="Calibri"/>
@@ -7047,18 +6593,12 @@
           <a:p>
             <a:pPr marL="383540" lvl="1"/>
             <a:r>
-              <a:rPr lang="en-US" dirty="0"/>
-              <a:t>Editing a coach's capacity</a:t>
-            </a:r>
-            <a:endParaRPr lang="en-US" dirty="0">
-              <a:cs typeface="Calibri"/>
-            </a:endParaRPr>
-          </a:p>
-          <a:p>
-            <a:pPr marL="383540" lvl="1"/>
-            <a:r>
-              <a:rPr lang="en-US" dirty="0"/>
-              <a:t>Deleting a coach record</a:t>
+              <a:rPr lang="en-US" dirty="0" smtClean="0"/>
+              <a:t>Delete </a:t>
+            </a:r>
+            <a:r>
+              <a:rPr lang="en-US" dirty="0"/>
+              <a:t>a coach record</a:t>
             </a:r>
             <a:endParaRPr lang="en-US" dirty="0">
               <a:cs typeface="Calibri" panose="020F0502020204030204"/>
@@ -7066,8 +6606,8 @@
           </a:p>
           <a:p>
             <a:pPr marL="383540" lvl="1"/>
-            <a:endParaRPr lang="en-US">
-              <a:cs typeface="Calibri"/>
+            <a:endParaRPr lang="en-US" dirty="0">
+              <a:cs typeface="Calibri" panose="020F0502020204030204"/>
             </a:endParaRPr>
           </a:p>
         </p:txBody>
@@ -7082,6 +6622,13 @@
   <p:clrMapOvr>
     <a:masterClrMapping/>
   </p:clrMapOvr>
+  <p:timing>
+    <p:tnLst>
+      <p:par>
+        <p:cTn id="1" dur="indefinite" restart="never" nodeType="tmRoot"/>
+      </p:par>
+    </p:tnLst>
+  </p:timing>
 </p:sld>
 </file>
 
@@ -7154,51 +6701,56 @@
           <a:lstStyle/>
           <a:p>
             <a:r>
-              <a:rPr lang="en-US"/>
+              <a:rPr lang="en-US" dirty="0"/>
               <a:t>The user stories that will be demonstrated for the desktop application will be:</a:t>
             </a:r>
           </a:p>
           <a:p>
             <a:pPr lvl="1"/>
             <a:r>
-              <a:rPr lang="en-US"/>
-              <a:t>Logging in</a:t>
-            </a:r>
+              <a:rPr lang="en-US" dirty="0" smtClean="0"/>
+              <a:t>Login</a:t>
+            </a:r>
+            <a:endParaRPr lang="en-US" dirty="0"/>
           </a:p>
           <a:p>
             <a:pPr lvl="1"/>
             <a:r>
-              <a:rPr lang="en-US"/>
-              <a:t>Selecting a shift</a:t>
+              <a:rPr lang="en-US" dirty="0" smtClean="0"/>
+              <a:t>Select a shift</a:t>
             </a:r>
           </a:p>
           <a:p>
             <a:pPr lvl="1"/>
             <a:r>
-              <a:rPr lang="en-US"/>
-              <a:t>Starting a journey</a:t>
-            </a:r>
+              <a:rPr lang="en-US" dirty="0" smtClean="0"/>
+              <a:t>View stops</a:t>
+            </a:r>
+            <a:endParaRPr lang="en-US" dirty="0"/>
           </a:p>
           <a:p>
             <a:pPr lvl="1"/>
             <a:r>
-              <a:rPr lang="en-US"/>
-              <a:t>Going to stops</a:t>
-            </a:r>
+              <a:rPr lang="en-US" dirty="0" smtClean="0"/>
+              <a:t>Start </a:t>
+            </a:r>
+            <a:r>
+              <a:rPr lang="en-US" dirty="0"/>
+              <a:t>a </a:t>
+            </a:r>
+            <a:r>
+              <a:rPr lang="en-US" dirty="0" smtClean="0"/>
+              <a:t>journey</a:t>
+            </a:r>
+            <a:endParaRPr lang="en-US" dirty="0"/>
           </a:p>
           <a:p>
             <a:pPr lvl="1"/>
             <a:r>
-              <a:rPr lang="en-US"/>
-              <a:t>Accepting bookings</a:t>
-            </a:r>
-          </a:p>
-          <a:p>
-            <a:pPr lvl="1"/>
-            <a:r>
-              <a:rPr lang="en-US"/>
-              <a:t>Ending journeys</a:t>
-            </a:r>
+              <a:rPr lang="en-US" dirty="0" smtClean="0"/>
+              <a:t>View bookings</a:t>
+            </a:r>
+            <a:endParaRPr lang="en-US" dirty="0"/>
           </a:p>
         </p:txBody>
       </p:sp>
@@ -7212,6 +6764,13 @@
   <p:clrMapOvr>
     <a:masterClrMapping/>
   </p:clrMapOvr>
+  <p:timing>
+    <p:tnLst>
+      <p:par>
+        <p:cTn id="1" dur="indefinite" restart="never" nodeType="tmRoot"/>
+      </p:par>
+    </p:tnLst>
+  </p:timing>
 </p:sld>
 </file>
 
@@ -7270,6 +6829,13 @@
   <p:clrMapOvr>
     <a:masterClrMapping/>
   </p:clrMapOvr>
+  <p:timing>
+    <p:tnLst>
+      <p:par>
+        <p:cTn id="1" dur="indefinite" restart="never" nodeType="tmRoot"/>
+      </p:par>
+    </p:tnLst>
+  </p:timing>
 </p:sld>
 </file>
 
@@ -7344,16 +6910,175 @@
           </a:bodyPr>
           <a:lstStyle/>
           <a:p>
+            <a:pPr>
+              <a:buFont typeface="Arial" panose="020B0604020202020204" pitchFamily="34" charset="0"/>
+              <a:buChar char="•"/>
+            </a:pPr>
+            <a:r>
+              <a:rPr lang="en-US" dirty="0" smtClean="0">
+                <a:cs typeface="Calibri"/>
+              </a:rPr>
+              <a:t> Create </a:t>
+            </a:r>
             <a:r>
               <a:rPr lang="en-US" dirty="0">
                 <a:cs typeface="Calibri"/>
               </a:rPr>
-              <a:t>Create an account:</a:t>
+              <a:t>an </a:t>
+            </a:r>
+            <a:r>
+              <a:rPr lang="en-US" dirty="0" smtClean="0">
+                <a:cs typeface="Calibri"/>
+              </a:rPr>
+              <a:t>account</a:t>
+            </a:r>
+          </a:p>
+          <a:p>
+            <a:pPr>
+              <a:buFont typeface="Arial" panose="020B0604020202020204" pitchFamily="34" charset="0"/>
+              <a:buChar char="•"/>
+            </a:pPr>
+            <a:r>
+              <a:rPr lang="en-US" dirty="0" smtClean="0">
+                <a:cs typeface="Calibri"/>
+              </a:rPr>
+              <a:t> Login</a:t>
+            </a:r>
+          </a:p>
+          <a:p>
+            <a:pPr>
+              <a:buFont typeface="Arial" panose="020B0604020202020204" pitchFamily="34" charset="0"/>
+              <a:buChar char="•"/>
+            </a:pPr>
+            <a:r>
+              <a:rPr lang="en-US" dirty="0" smtClean="0">
+                <a:cs typeface="Calibri"/>
+              </a:rPr>
+              <a:t> View account details</a:t>
             </a:r>
             <a:endParaRPr lang="en-US" dirty="0"/>
           </a:p>
         </p:txBody>
       </p:sp>
+      <p:pic>
+        <p:nvPicPr>
+          <p:cNvPr id="1026" name="Picture 2" descr="https://scontent-lht6-1.xx.fbcdn.net/v/t1.15752-9/59701656_2172178846169561_2667932821263220736_n.jpg?_nc_cat=109&amp;_nc_ht=scontent-lht6-1.xx&amp;oh=2a44ba8790173561c2a47a58bdce1aa5&amp;oe=5D76871D"/>
+          <p:cNvPicPr>
+            <a:picLocks noChangeAspect="1" noChangeArrowheads="1"/>
+          </p:cNvPicPr>
+          <p:nvPr/>
+        </p:nvPicPr>
+        <p:blipFill>
+          <a:blip r:embed="rId2">
+            <a:extLst>
+              <a:ext uri="{28A0092B-C50C-407E-A947-70E740481C1C}">
+                <a14:useLocalDpi xmlns:a14="http://schemas.microsoft.com/office/drawing/2010/main" val="0"/>
+              </a:ext>
+            </a:extLst>
+          </a:blip>
+          <a:srcRect/>
+          <a:stretch>
+            <a:fillRect/>
+          </a:stretch>
+        </p:blipFill>
+        <p:spPr bwMode="auto">
+          <a:xfrm>
+            <a:off x="3535338" y="1845734"/>
+            <a:ext cx="2042501" cy="4257562"/>
+          </a:xfrm>
+          <a:prstGeom prst="rect">
+            <a:avLst/>
+          </a:prstGeom>
+          <a:noFill/>
+          <a:extLst>
+            <a:ext uri="{909E8E84-426E-40DD-AFC4-6F175D3DCCD1}">
+              <a14:hiddenFill xmlns:a14="http://schemas.microsoft.com/office/drawing/2010/main">
+                <a:solidFill>
+                  <a:srgbClr val="FFFFFF"/>
+                </a:solidFill>
+              </a14:hiddenFill>
+            </a:ext>
+          </a:extLst>
+        </p:spPr>
+      </p:pic>
+      <p:pic>
+        <p:nvPicPr>
+          <p:cNvPr id="1028" name="Picture 4" descr="https://scontent-lht6-1.xx.fbcdn.net/v/t1.15752-9/s2048x2048/59867683_2204773879598776_368353957426233344_n.jpg?_nc_cat=102&amp;_nc_ht=scontent-lht6-1.xx&amp;oh=13bb841ea27909b47c1e6d713a4cb3e3&amp;oe=5D64A73E"/>
+          <p:cNvPicPr>
+            <a:picLocks noChangeAspect="1" noChangeArrowheads="1"/>
+          </p:cNvPicPr>
+          <p:nvPr/>
+        </p:nvPicPr>
+        <p:blipFill rotWithShape="1">
+          <a:blip r:embed="rId3">
+            <a:extLst>
+              <a:ext uri="{28A0092B-C50C-407E-A947-70E740481C1C}">
+                <a14:useLocalDpi xmlns:a14="http://schemas.microsoft.com/office/drawing/2010/main" val="0"/>
+              </a:ext>
+            </a:extLst>
+          </a:blip>
+          <a:srcRect t="3320"/>
+          <a:stretch/>
+        </p:blipFill>
+        <p:spPr bwMode="auto">
+          <a:xfrm>
+            <a:off x="5952953" y="1987062"/>
+            <a:ext cx="2170137" cy="4116234"/>
+          </a:xfrm>
+          <a:prstGeom prst="rect">
+            <a:avLst/>
+          </a:prstGeom>
+          <a:noFill/>
+          <a:extLst>
+            <a:ext uri="{909E8E84-426E-40DD-AFC4-6F175D3DCCD1}">
+              <a14:hiddenFill xmlns:a14="http://schemas.microsoft.com/office/drawing/2010/main">
+                <a:solidFill>
+                  <a:srgbClr val="FFFFFF"/>
+                </a:solidFill>
+              </a14:hiddenFill>
+            </a:ext>
+          </a:extLst>
+        </p:spPr>
+      </p:pic>
+      <p:pic>
+        <p:nvPicPr>
+          <p:cNvPr id="1030" name="Picture 6" descr="https://scontent-lht6-1.xx.fbcdn.net/v/t1.15752-9/s2048x2048/59739163_2061391497321762_6222268041116254208_n.jpg?_nc_cat=105&amp;_nc_ht=scontent-lht6-1.xx&amp;oh=110b7c9a2b89e4b6b83ae64d007fc20f&amp;oe=5D2C6E8B"/>
+          <p:cNvPicPr>
+            <a:picLocks noChangeAspect="1" noChangeArrowheads="1"/>
+          </p:cNvPicPr>
+          <p:nvPr/>
+        </p:nvPicPr>
+        <p:blipFill rotWithShape="1">
+          <a:blip r:embed="rId4">
+            <a:extLst>
+              <a:ext uri="{28A0092B-C50C-407E-A947-70E740481C1C}">
+                <a14:useLocalDpi xmlns:a14="http://schemas.microsoft.com/office/drawing/2010/main" val="0"/>
+              </a:ext>
+            </a:extLst>
+          </a:blip>
+          <a:srcRect t="3320"/>
+          <a:stretch/>
+        </p:blipFill>
+        <p:spPr bwMode="auto">
+          <a:xfrm>
+            <a:off x="8498204" y="1987062"/>
+            <a:ext cx="2169795" cy="4116234"/>
+          </a:xfrm>
+          <a:prstGeom prst="rect">
+            <a:avLst/>
+          </a:prstGeom>
+          <a:noFill/>
+          <a:extLst>
+            <a:ext uri="{909E8E84-426E-40DD-AFC4-6F175D3DCCD1}">
+              <a14:hiddenFill xmlns:a14="http://schemas.microsoft.com/office/drawing/2010/main">
+                <a:solidFill>
+                  <a:srgbClr val="FFFFFF"/>
+                </a:solidFill>
+              </a14:hiddenFill>
+            </a:ext>
+          </a:extLst>
+        </p:spPr>
+      </p:pic>
     </p:spTree>
     <p:extLst>
       <p:ext uri="{BB962C8B-B14F-4D97-AF65-F5344CB8AC3E}">
@@ -7364,6 +7089,13 @@
   <p:clrMapOvr>
     <a:masterClrMapping/>
   </p:clrMapOvr>
+  <p:timing>
+    <p:tnLst>
+      <p:par>
+        <p:cTn id="1" dur="indefinite" restart="never" nodeType="tmRoot"/>
+      </p:par>
+    </p:tnLst>
+  </p:timing>
 </p:sld>
 </file>
 
@@ -7389,7 +7121,7 @@
           <p:cNvPr id="2" name="Title 1">
             <a:extLst>
               <a:ext uri="{FF2B5EF4-FFF2-40B4-BE49-F238E27FC236}">
-                <a16:creationId xmlns:a16="http://schemas.microsoft.com/office/drawing/2014/main" id="{BE901AD9-752E-480C-922A-BA00B2629972}"/>
+                <a16:creationId xmlns:a16="http://schemas.microsoft.com/office/drawing/2014/main" id="{181FCE6F-3A44-4C61-8008-82A517D0FE3E}"/>
               </a:ext>
             </a:extLst>
           </p:cNvPr>
@@ -7417,7 +7149,7 @@
           <p:cNvPr id="3" name="Content Placeholder 2">
             <a:extLst>
               <a:ext uri="{FF2B5EF4-FFF2-40B4-BE49-F238E27FC236}">
-                <a16:creationId xmlns:a16="http://schemas.microsoft.com/office/drawing/2014/main" id="{6EB65DE5-FECB-4974-BD6B-58410BCEA553}"/>
+                <a16:creationId xmlns:a16="http://schemas.microsoft.com/office/drawing/2014/main" id="{D98B83F6-8DDD-438B-B944-99EBA9134F5A}"/>
               </a:ext>
             </a:extLst>
           </p:cNvPr>
@@ -7435,23 +7167,120 @@
           </a:bodyPr>
           <a:lstStyle/>
           <a:p>
-            <a:r>
-              <a:rPr lang="en-US"/>
-              <a:t>Logging in:</a:t>
-            </a:r>
-          </a:p>
-        </p:txBody>
-      </p:sp>
+            <a:pPr>
+              <a:buFont typeface="Arial" panose="020B0604020202020204" pitchFamily="34" charset="0"/>
+              <a:buChar char="•"/>
+            </a:pPr>
+            <a:r>
+              <a:rPr lang="en-US" dirty="0" smtClean="0"/>
+              <a:t> Search </a:t>
+            </a:r>
+            <a:r>
+              <a:rPr lang="en-US" dirty="0"/>
+              <a:t>for a </a:t>
+            </a:r>
+            <a:r>
+              <a:rPr lang="en-US" dirty="0" smtClean="0"/>
+              <a:t>journey</a:t>
+            </a:r>
+          </a:p>
+        </p:txBody>
+      </p:sp>
+      <p:pic>
+        <p:nvPicPr>
+          <p:cNvPr id="2052" name="Picture 4" descr="https://scontent-lht6-1.xx.fbcdn.net/v/t1.15752-9/s2048x2048/59531201_603874606792808_7766007419057995776_n.jpg?_nc_cat=103&amp;_nc_ht=scontent-lht6-1.xx&amp;oh=2e35f037df7b030afdb1e87902b3d851&amp;oe=5D67C52C"/>
+          <p:cNvPicPr>
+            <a:picLocks noChangeAspect="1" noChangeArrowheads="1"/>
+          </p:cNvPicPr>
+          <p:nvPr/>
+        </p:nvPicPr>
+        <p:blipFill rotWithShape="1">
+          <a:blip r:embed="rId2">
+            <a:extLst>
+              <a:ext uri="{28A0092B-C50C-407E-A947-70E740481C1C}">
+                <a14:useLocalDpi xmlns:a14="http://schemas.microsoft.com/office/drawing/2010/main" val="0"/>
+              </a:ext>
+            </a:extLst>
+          </a:blip>
+          <a:srcRect t="3051"/>
+          <a:stretch/>
+        </p:blipFill>
+        <p:spPr bwMode="auto">
+          <a:xfrm>
+            <a:off x="4583831" y="2110153"/>
+            <a:ext cx="2055724" cy="4098076"/>
+          </a:xfrm>
+          <a:prstGeom prst="rect">
+            <a:avLst/>
+          </a:prstGeom>
+          <a:noFill/>
+          <a:extLst>
+            <a:ext uri="{909E8E84-426E-40DD-AFC4-6F175D3DCCD1}">
+              <a14:hiddenFill xmlns:a14="http://schemas.microsoft.com/office/drawing/2010/main">
+                <a:solidFill>
+                  <a:srgbClr val="FFFFFF"/>
+                </a:solidFill>
+              </a14:hiddenFill>
+            </a:ext>
+          </a:extLst>
+        </p:spPr>
+      </p:pic>
+      <p:pic>
+        <p:nvPicPr>
+          <p:cNvPr id="2056" name="Picture 8" descr="https://scontent-lht6-1.xx.fbcdn.net/v/t1.15752-9/s2048x2048/59516131_422779095181309_3746407712108314624_n.jpg?_nc_cat=104&amp;_nc_ht=scontent-lht6-1.xx&amp;oh=667b56fdc0f6cfa74dd7b0dd062df451&amp;oe=5D65C494"/>
+          <p:cNvPicPr>
+            <a:picLocks noChangeAspect="1" noChangeArrowheads="1"/>
+          </p:cNvPicPr>
+          <p:nvPr/>
+        </p:nvPicPr>
+        <p:blipFill rotWithShape="1">
+          <a:blip r:embed="rId3">
+            <a:extLst>
+              <a:ext uri="{28A0092B-C50C-407E-A947-70E740481C1C}">
+                <a14:useLocalDpi xmlns:a14="http://schemas.microsoft.com/office/drawing/2010/main" val="0"/>
+              </a:ext>
+            </a:extLst>
+          </a:blip>
+          <a:srcRect t="4091"/>
+          <a:stretch/>
+        </p:blipFill>
+        <p:spPr bwMode="auto">
+          <a:xfrm>
+            <a:off x="7120160" y="2110153"/>
+            <a:ext cx="2267973" cy="4054115"/>
+          </a:xfrm>
+          <a:prstGeom prst="rect">
+            <a:avLst/>
+          </a:prstGeom>
+          <a:noFill/>
+          <a:extLst>
+            <a:ext uri="{909E8E84-426E-40DD-AFC4-6F175D3DCCD1}">
+              <a14:hiddenFill xmlns:a14="http://schemas.microsoft.com/office/drawing/2010/main">
+                <a:solidFill>
+                  <a:srgbClr val="FFFFFF"/>
+                </a:solidFill>
+              </a14:hiddenFill>
+            </a:ext>
+          </a:extLst>
+        </p:spPr>
+      </p:pic>
     </p:spTree>
     <p:extLst>
       <p:ext uri="{BB962C8B-B14F-4D97-AF65-F5344CB8AC3E}">
-        <p14:creationId xmlns:p14="http://schemas.microsoft.com/office/powerpoint/2010/main" val="1547740945"/>
+        <p14:creationId xmlns:p14="http://schemas.microsoft.com/office/powerpoint/2010/main" val="3274306297"/>
       </p:ext>
     </p:extLst>
   </p:cSld>
   <p:clrMapOvr>
     <a:masterClrMapping/>
   </p:clrMapOvr>
+  <p:timing>
+    <p:tnLst>
+      <p:par>
+        <p:cTn id="1" dur="indefinite" restart="never" nodeType="tmRoot"/>
+      </p:par>
+    </p:tnLst>
+  </p:timing>
 </p:sld>
 </file>
 
@@ -7474,72 +7303,243 @@
       </p:grpSpPr>
       <p:sp>
         <p:nvSpPr>
-          <p:cNvPr id="2" name="Title 1">
+          <p:cNvPr id="2" name="Title 1"/>
+          <p:cNvSpPr>
+            <a:spLocks noGrp="1"/>
+          </p:cNvSpPr>
+          <p:nvPr>
+            <p:ph type="title"/>
+          </p:nvPr>
+        </p:nvSpPr>
+        <p:spPr/>
+        <p:txBody>
+          <a:bodyPr/>
+          <a:lstStyle/>
+          <a:p>
+            <a:r>
+              <a:rPr lang="en-GB" dirty="0" smtClean="0"/>
+              <a:t>Mobile Application</a:t>
+            </a:r>
+            <a:endParaRPr lang="en-GB" dirty="0"/>
+          </a:p>
+        </p:txBody>
+      </p:sp>
+      <p:sp>
+        <p:nvSpPr>
+          <p:cNvPr id="3" name="Content Placeholder 2"/>
+          <p:cNvSpPr>
+            <a:spLocks noGrp="1"/>
+          </p:cNvSpPr>
+          <p:nvPr>
+            <p:ph idx="1"/>
+          </p:nvPr>
+        </p:nvSpPr>
+        <p:spPr/>
+        <p:txBody>
+          <a:bodyPr/>
+          <a:lstStyle/>
+          <a:p>
+            <a:pPr>
+              <a:buFont typeface="Arial" panose="020B0604020202020204" pitchFamily="34" charset="0"/>
+              <a:buChar char="•"/>
+            </a:pPr>
+            <a:r>
+              <a:rPr lang="en-US" dirty="0" smtClean="0"/>
+              <a:t> Book </a:t>
+            </a:r>
+            <a:r>
+              <a:rPr lang="en-US" dirty="0"/>
+              <a:t>ticket</a:t>
+            </a:r>
+          </a:p>
+          <a:p>
+            <a:pPr>
+              <a:buFont typeface="Arial" panose="020B0604020202020204" pitchFamily="34" charset="0"/>
+              <a:buChar char="•"/>
+            </a:pPr>
+            <a:r>
+              <a:rPr lang="en-US" dirty="0"/>
+              <a:t> View booking</a:t>
+            </a:r>
+          </a:p>
+          <a:p>
+            <a:endParaRPr lang="en-GB" dirty="0"/>
+          </a:p>
+        </p:txBody>
+      </p:sp>
+      <p:pic>
+        <p:nvPicPr>
+          <p:cNvPr id="4" name="Picture 10" descr="https://scontent-lht6-1.xx.fbcdn.net/v/t1.15752-9/s2048x2048/60113859_277900969818403_4002029605627101184_n.jpg?_nc_cat=106&amp;_nc_ht=scontent-lht6-1.xx&amp;oh=27d0bc854b338fa3a6a9b94398b756b1&amp;oe=5D6D6866"/>
+          <p:cNvPicPr>
+            <a:picLocks noChangeAspect="1" noChangeArrowheads="1"/>
+          </p:cNvPicPr>
+          <p:nvPr/>
+        </p:nvPicPr>
+        <p:blipFill rotWithShape="1">
+          <a:blip r:embed="rId2">
             <a:extLst>
-              <a:ext uri="{FF2B5EF4-FFF2-40B4-BE49-F238E27FC236}">
-                <a16:creationId xmlns:a16="http://schemas.microsoft.com/office/drawing/2014/main" id="{9F86D8C8-FAA1-4B2B-9621-9D66583B341D}"/>
+              <a:ext uri="{28A0092B-C50C-407E-A947-70E740481C1C}">
+                <a14:useLocalDpi xmlns:a14="http://schemas.microsoft.com/office/drawing/2010/main" val="0"/>
               </a:ext>
             </a:extLst>
-          </p:cNvPr>
-          <p:cNvSpPr>
-            <a:spLocks noGrp="1"/>
-          </p:cNvSpPr>
-          <p:nvPr>
-            <p:ph type="title"/>
-          </p:nvPr>
-        </p:nvSpPr>
-        <p:spPr/>
-        <p:txBody>
-          <a:bodyPr/>
-          <a:lstStyle/>
-          <a:p>
-            <a:r>
-              <a:rPr lang="en-US" dirty="0"/>
-              <a:t>Mobile Application</a:t>
-            </a:r>
-          </a:p>
-        </p:txBody>
-      </p:sp>
-      <p:sp>
-        <p:nvSpPr>
-          <p:cNvPr id="3" name="Content Placeholder 2">
+          </a:blip>
+          <a:srcRect t="3741"/>
+          <a:stretch/>
+        </p:blipFill>
+        <p:spPr bwMode="auto">
+          <a:xfrm>
+            <a:off x="2677012" y="1845734"/>
+            <a:ext cx="2202887" cy="4220774"/>
+          </a:xfrm>
+          <a:prstGeom prst="rect">
+            <a:avLst/>
+          </a:prstGeom>
+          <a:noFill/>
+          <a:extLst>
+            <a:ext uri="{909E8E84-426E-40DD-AFC4-6F175D3DCCD1}">
+              <a14:hiddenFill xmlns:a14="http://schemas.microsoft.com/office/drawing/2010/main">
+                <a:solidFill>
+                  <a:srgbClr val="FFFFFF"/>
+                </a:solidFill>
+              </a14:hiddenFill>
+            </a:ext>
+          </a:extLst>
+        </p:spPr>
+      </p:pic>
+      <p:pic>
+        <p:nvPicPr>
+          <p:cNvPr id="3076" name="Picture 4" descr="https://scontent-lht6-1.xx.fbcdn.net/v/t1.15752-9/s2048x2048/59545771_357157014916239_337950304844644352_n.jpg?_nc_cat=107&amp;_nc_ht=scontent-lht6-1.xx&amp;oh=c2a956f3407c25a2c29dfeb890340d5c&amp;oe=5D5B0D3A"/>
+          <p:cNvPicPr>
+            <a:picLocks noChangeAspect="1" noChangeArrowheads="1"/>
+          </p:cNvPicPr>
+          <p:nvPr/>
+        </p:nvPicPr>
+        <p:blipFill rotWithShape="1">
+          <a:blip r:embed="rId3">
             <a:extLst>
-              <a:ext uri="{FF2B5EF4-FFF2-40B4-BE49-F238E27FC236}">
-                <a16:creationId xmlns:a16="http://schemas.microsoft.com/office/drawing/2014/main" id="{20B3D6A8-B237-4E78-A6C3-4429E2D4FA70}"/>
+              <a:ext uri="{28A0092B-C50C-407E-A947-70E740481C1C}">
+                <a14:useLocalDpi xmlns:a14="http://schemas.microsoft.com/office/drawing/2010/main" val="0"/>
               </a:ext>
             </a:extLst>
-          </p:cNvPr>
-          <p:cNvSpPr>
-            <a:spLocks noGrp="1"/>
-          </p:cNvSpPr>
-          <p:nvPr>
-            <p:ph idx="1"/>
-          </p:nvPr>
-        </p:nvSpPr>
-        <p:spPr/>
-        <p:txBody>
-          <a:bodyPr vert="horz" lIns="91440" tIns="45720" rIns="91440" bIns="45720" rtlCol="0" anchor="t">
-            <a:normAutofit/>
-          </a:bodyPr>
-          <a:lstStyle/>
-          <a:p>
-            <a:r>
-              <a:rPr lang="en-US"/>
-              <a:t>Viewing account details:</a:t>
-            </a:r>
-          </a:p>
-        </p:txBody>
-      </p:sp>
+          </a:blip>
+          <a:srcRect t="3217"/>
+          <a:stretch/>
+        </p:blipFill>
+        <p:spPr bwMode="auto">
+          <a:xfrm>
+            <a:off x="5122651" y="1845734"/>
+            <a:ext cx="2103574" cy="4220774"/>
+          </a:xfrm>
+          <a:prstGeom prst="rect">
+            <a:avLst/>
+          </a:prstGeom>
+          <a:noFill/>
+          <a:extLst>
+            <a:ext uri="{909E8E84-426E-40DD-AFC4-6F175D3DCCD1}">
+              <a14:hiddenFill xmlns:a14="http://schemas.microsoft.com/office/drawing/2010/main">
+                <a:solidFill>
+                  <a:srgbClr val="FFFFFF"/>
+                </a:solidFill>
+              </a14:hiddenFill>
+            </a:ext>
+          </a:extLst>
+        </p:spPr>
+      </p:pic>
+      <p:pic>
+        <p:nvPicPr>
+          <p:cNvPr id="3078" name="Picture 6" descr="https://scontent-lht6-1.xx.fbcdn.net/v/t1.15752-9/s2048x2048/60016351_2211897092473541_2705422723206610944_n.jpg?_nc_cat=111&amp;_nc_ht=scontent-lht6-1.xx&amp;oh=af2dbcb6b7e24020f4cc141ff9635e07&amp;oe=5D2FC214"/>
+          <p:cNvPicPr>
+            <a:picLocks noChangeAspect="1" noChangeArrowheads="1"/>
+          </p:cNvPicPr>
+          <p:nvPr/>
+        </p:nvPicPr>
+        <p:blipFill rotWithShape="1">
+          <a:blip r:embed="rId4">
+            <a:extLst>
+              <a:ext uri="{28A0092B-C50C-407E-A947-70E740481C1C}">
+                <a14:useLocalDpi xmlns:a14="http://schemas.microsoft.com/office/drawing/2010/main" val="0"/>
+              </a:ext>
+            </a:extLst>
+          </a:blip>
+          <a:srcRect t="3607"/>
+          <a:stretch/>
+        </p:blipFill>
+        <p:spPr bwMode="auto">
+          <a:xfrm>
+            <a:off x="7468977" y="1883318"/>
+            <a:ext cx="2092290" cy="4145605"/>
+          </a:xfrm>
+          <a:prstGeom prst="rect">
+            <a:avLst/>
+          </a:prstGeom>
+          <a:noFill/>
+          <a:extLst>
+            <a:ext uri="{909E8E84-426E-40DD-AFC4-6F175D3DCCD1}">
+              <a14:hiddenFill xmlns:a14="http://schemas.microsoft.com/office/drawing/2010/main">
+                <a:solidFill>
+                  <a:srgbClr val="FFFFFF"/>
+                </a:solidFill>
+              </a14:hiddenFill>
+            </a:ext>
+          </a:extLst>
+        </p:spPr>
+      </p:pic>
+      <p:pic>
+        <p:nvPicPr>
+          <p:cNvPr id="3080" name="Picture 8" descr="https://scontent-lht6-1.xx.fbcdn.net/v/t1.15752-9/s2048x2048/59723707_2317042635282194_5217536433073422336_n.jpg?_nc_cat=107&amp;_nc_ht=scontent-lht6-1.xx&amp;oh=bce3e924904665858f4753ce6c811cc9&amp;oe=5D7791A9"/>
+          <p:cNvPicPr>
+            <a:picLocks noChangeAspect="1" noChangeArrowheads="1"/>
+          </p:cNvPicPr>
+          <p:nvPr/>
+        </p:nvPicPr>
+        <p:blipFill rotWithShape="1">
+          <a:blip r:embed="rId5">
+            <a:extLst>
+              <a:ext uri="{28A0092B-C50C-407E-A947-70E740481C1C}">
+                <a14:useLocalDpi xmlns:a14="http://schemas.microsoft.com/office/drawing/2010/main" val="0"/>
+              </a:ext>
+            </a:extLst>
+          </a:blip>
+          <a:srcRect t="3648"/>
+          <a:stretch/>
+        </p:blipFill>
+        <p:spPr bwMode="auto">
+          <a:xfrm>
+            <a:off x="9804019" y="1883318"/>
+            <a:ext cx="2060246" cy="4145605"/>
+          </a:xfrm>
+          <a:prstGeom prst="rect">
+            <a:avLst/>
+          </a:prstGeom>
+          <a:noFill/>
+          <a:extLst>
+            <a:ext uri="{909E8E84-426E-40DD-AFC4-6F175D3DCCD1}">
+              <a14:hiddenFill xmlns:a14="http://schemas.microsoft.com/office/drawing/2010/main">
+                <a:solidFill>
+                  <a:srgbClr val="FFFFFF"/>
+                </a:solidFill>
+              </a14:hiddenFill>
+            </a:ext>
+          </a:extLst>
+        </p:spPr>
+      </p:pic>
     </p:spTree>
     <p:extLst>
       <p:ext uri="{BB962C8B-B14F-4D97-AF65-F5344CB8AC3E}">
-        <p14:creationId xmlns:p14="http://schemas.microsoft.com/office/powerpoint/2010/main" val="2331381015"/>
+        <p14:creationId xmlns:p14="http://schemas.microsoft.com/office/powerpoint/2010/main" val="2544795120"/>
       </p:ext>
     </p:extLst>
   </p:cSld>
   <p:clrMapOvr>
     <a:masterClrMapping/>
   </p:clrMapOvr>
+  <p:timing>
+    <p:tnLst>
+      <p:par>
+        <p:cTn id="1" dur="indefinite" restart="never" nodeType="tmRoot"/>
+      </p:par>
+    </p:tnLst>
+  </p:timing>
 </p:sld>
 </file>
 

</xml_diff>

<commit_message>
rest of minutes done, presentation altered
</commit_message>
<xml_diff>
--- a/Documents/Presentation/PRCS252E - Presentation.pptx
+++ b/Documents/Presentation/PRCS252E - Presentation.pptx
@@ -5302,7 +5302,6 @@
               <a:rPr lang="en-US" dirty="0" smtClean="0"/>
               <a:t>capacity</a:t>
             </a:r>
-            <a:endParaRPr lang="en-US" dirty="0" smtClean="0"/>
           </a:p>
           <a:p>
             <a:pPr>
@@ -6178,15 +6177,19 @@
             <a:pPr lvl="1"/>
             <a:r>
               <a:rPr lang="en-US" dirty="0"/>
-              <a:t>HCI has been used in order to benefit the experience of the end user (e.g. large buttons on desktop app for touch screen use, simplistic UI for Android app, easily </a:t>
-            </a:r>
-            <a:r>
-              <a:rPr lang="en-US" dirty="0" err="1"/>
-              <a:t>navigatable</a:t>
-            </a:r>
-            <a:r>
-              <a:rPr lang="en-US" dirty="0"/>
-              <a:t> web app).</a:t>
+              <a:t>HCI has been used in order to benefit the experience of the end user (e.g. large buttons on desktop app for touch screen use, simplistic UI for Android app, </a:t>
+            </a:r>
+            <a:r>
+              <a:rPr lang="en-US"/>
+              <a:t>easily </a:t>
+            </a:r>
+            <a:r>
+              <a:rPr lang="en-US" smtClean="0"/>
+              <a:t>navigable </a:t>
+            </a:r>
+            <a:r>
+              <a:rPr lang="en-US" dirty="0"/>
+              <a:t>web app).</a:t>
             </a:r>
           </a:p>
           <a:p>

</xml_diff>